<commit_message>
Changes to the code and ppt
</commit_message>
<xml_diff>
--- a/20191021-Intro2R/20191021_Intro_to_R.pptx
+++ b/20191021-Intro2R/20191021_Intro_to_R.pptx
@@ -5,34 +5,35 @@
     <p:sldMasterId id="2147483714" r:id="rId1"/>
     <p:sldMasterId id="2147483726" r:id="rId2"/>
     <p:sldMasterId id="2147483738" r:id="rId3"/>
+    <p:sldMasterId id="2147483750" r:id="rId4"/>
   </p:sldMasterIdLst>
   <p:notesMasterIdLst>
-    <p:notesMasterId r:id="rId24"/>
+    <p:notesMasterId r:id="rId25"/>
   </p:notesMasterIdLst>
   <p:handoutMasterIdLst>
-    <p:handoutMasterId r:id="rId25"/>
+    <p:handoutMasterId r:id="rId26"/>
   </p:handoutMasterIdLst>
   <p:sldIdLst>
-    <p:sldId id="256" r:id="rId4"/>
-    <p:sldId id="260" r:id="rId5"/>
-    <p:sldId id="268" r:id="rId6"/>
-    <p:sldId id="258" r:id="rId7"/>
-    <p:sldId id="269" r:id="rId8"/>
-    <p:sldId id="270" r:id="rId9"/>
-    <p:sldId id="263" r:id="rId10"/>
-    <p:sldId id="271" r:id="rId11"/>
-    <p:sldId id="273" r:id="rId12"/>
-    <p:sldId id="277" r:id="rId13"/>
-    <p:sldId id="275" r:id="rId14"/>
-    <p:sldId id="274" r:id="rId15"/>
-    <p:sldId id="272" r:id="rId16"/>
-    <p:sldId id="278" r:id="rId17"/>
-    <p:sldId id="279" r:id="rId18"/>
-    <p:sldId id="264" r:id="rId19"/>
-    <p:sldId id="265" r:id="rId20"/>
-    <p:sldId id="259" r:id="rId21"/>
-    <p:sldId id="266" r:id="rId22"/>
-    <p:sldId id="267" r:id="rId23"/>
+    <p:sldId id="256" r:id="rId5"/>
+    <p:sldId id="260" r:id="rId6"/>
+    <p:sldId id="268" r:id="rId7"/>
+    <p:sldId id="258" r:id="rId8"/>
+    <p:sldId id="269" r:id="rId9"/>
+    <p:sldId id="270" r:id="rId10"/>
+    <p:sldId id="263" r:id="rId11"/>
+    <p:sldId id="271" r:id="rId12"/>
+    <p:sldId id="273" r:id="rId13"/>
+    <p:sldId id="277" r:id="rId14"/>
+    <p:sldId id="275" r:id="rId15"/>
+    <p:sldId id="274" r:id="rId16"/>
+    <p:sldId id="272" r:id="rId17"/>
+    <p:sldId id="278" r:id="rId18"/>
+    <p:sldId id="279" r:id="rId19"/>
+    <p:sldId id="264" r:id="rId20"/>
+    <p:sldId id="265" r:id="rId21"/>
+    <p:sldId id="259" r:id="rId22"/>
+    <p:sldId id="280" r:id="rId23"/>
+    <p:sldId id="267" r:id="rId24"/>
   </p:sldIdLst>
   <p:sldSz cx="12192000" cy="6858000"/>
   <p:notesSz cx="6858000" cy="9144000"/>
@@ -145,6 +146,9 @@
           </p15:clr>
         </p15:guide>
       </p15:sldGuideLst>
+    </p:ext>
+    <p:ext uri="{2D200454-40CA-4A62-9FC3-DE9A4176ACB9}">
+      <p15:notesGuideLst xmlns:p15="http://schemas.microsoft.com/office/powerpoint/2012/main"/>
     </p:ext>
   </p:extLst>
 </p:presentation>
@@ -2160,7 +2164,7 @@
       </dgm:t>
     </dgm:pt>
     <dgm:pt modelId="{8C1239BD-8F83-46FE-95DE-695226F1CD67}">
-      <dgm:prSet/>
+      <dgm:prSet custT="1"/>
       <dgm:spPr>
         <a:solidFill>
           <a:schemeClr val="tx2">
@@ -2174,7 +2178,15 @@
         <a:lstStyle/>
         <a:p>
           <a:r>
-            <a:rPr lang="en-US" dirty="0" err="1">
+            <a:rPr lang="en-US" sz="2200" b="0" i="0" dirty="0">
+              <a:solidFill>
+                <a:schemeClr val="bg1"/>
+              </a:solidFill>
+            </a:rPr>
+            <a:t>https://</a:t>
+          </a:r>
+          <a:r>
+            <a:rPr lang="en-US" sz="2200" b="0" i="0" dirty="0" err="1">
               <a:solidFill>
                 <a:schemeClr val="bg1"/>
               </a:solidFill>
@@ -2182,13 +2194,18 @@
             <a:t>tinyurl.com</a:t>
           </a:r>
           <a:r>
-            <a:rPr lang="en-US" dirty="0">
+            <a:rPr lang="en-US" sz="2200" b="0" i="0" dirty="0">
               <a:solidFill>
                 <a:schemeClr val="bg1"/>
               </a:solidFill>
             </a:rPr>
-            <a:t>/Intro2R_RLadiesGNV</a:t>
+            <a:t>/Intro2R-RLadiesGNV</a:t>
           </a:r>
+          <a:endParaRPr lang="en-US" sz="2200" b="0" dirty="0">
+            <a:solidFill>
+              <a:schemeClr val="bg1"/>
+            </a:solidFill>
+          </a:endParaRPr>
         </a:p>
       </dgm:t>
     </dgm:pt>
@@ -3613,12 +3630,12 @@
         <a:fontRef idx="minor"/>
       </dsp:style>
       <dsp:txBody>
-        <a:bodyPr spcFirstLastPara="0" vert="horz" wrap="square" lIns="99095" tIns="304800" rIns="99095" bIns="304800" numCol="1" spcCol="1270" anchor="ctr" anchorCtr="0">
+        <a:bodyPr spcFirstLastPara="0" vert="horz" wrap="square" lIns="99095" tIns="279400" rIns="99095" bIns="279400" numCol="1" spcCol="1270" anchor="ctr" anchorCtr="0">
           <a:noAutofit/>
         </a:bodyPr>
         <a:lstStyle/>
         <a:p>
-          <a:pPr marL="0" lvl="0" indent="0" algn="l" defTabSz="1066800">
+          <a:pPr marL="0" lvl="0" indent="0" algn="l" defTabSz="977900">
             <a:lnSpc>
               <a:spcPct val="90000"/>
             </a:lnSpc>
@@ -3631,7 +3648,15 @@
             <a:buNone/>
           </a:pPr>
           <a:r>
-            <a:rPr lang="en-US" sz="2400" kern="1200" dirty="0" err="1">
+            <a:rPr lang="en-US" sz="2200" b="0" i="0" kern="1200" dirty="0">
+              <a:solidFill>
+                <a:schemeClr val="bg1"/>
+              </a:solidFill>
+            </a:rPr>
+            <a:t>https://</a:t>
+          </a:r>
+          <a:r>
+            <a:rPr lang="en-US" sz="2200" b="0" i="0" kern="1200" dirty="0" err="1">
               <a:solidFill>
                 <a:schemeClr val="bg1"/>
               </a:solidFill>
@@ -3639,13 +3664,18 @@
             <a:t>tinyurl.com</a:t>
           </a:r>
           <a:r>
-            <a:rPr lang="en-US" sz="2400" kern="1200" dirty="0">
+            <a:rPr lang="en-US" sz="2200" b="0" i="0" kern="1200" dirty="0">
               <a:solidFill>
                 <a:schemeClr val="bg1"/>
               </a:solidFill>
             </a:rPr>
-            <a:t>/Intro2R_RLadiesGNV</a:t>
+            <a:t>/Intro2R-RLadiesGNV</a:t>
           </a:r>
+          <a:endParaRPr lang="en-US" sz="2200" b="0" kern="1200" dirty="0">
+            <a:solidFill>
+              <a:schemeClr val="bg1"/>
+            </a:solidFill>
+          </a:endParaRPr>
         </a:p>
       </dsp:txBody>
       <dsp:txXfrm>
@@ -6552,7 +6582,7 @@
           <a:p>
             <a:fld id="{165E8D14-8AEE-49BD-97C9-1174338A4BA1}" type="datetimeFigureOut">
               <a:rPr lang="en-US" smtClean="0"/>
-              <a:t>10/21/2019</a:t>
+              <a:t>10/25/2019</a:t>
             </a:fld>
             <a:endParaRPr lang="en-US"/>
           </a:p>
@@ -6729,7 +6759,7 @@
           <a:p>
             <a:fld id="{90E0DFF1-F837-4FB8-B9A8-B9317870281B}" type="datetimeFigureOut">
               <a:rPr lang="en-US" smtClean="0"/>
-              <a:t>10/21/2019</a:t>
+              <a:t>10/25/2019</a:t>
             </a:fld>
             <a:endParaRPr lang="en-US"/>
           </a:p>
@@ -7769,7 +7799,7 @@
           <a:p>
             <a:fld id="{04D585A5-86B4-45CA-97AB-632ED151FC06}" type="datetime1">
               <a:rPr lang="en-US" smtClean="0"/>
-              <a:t>10/21/2019</a:t>
+              <a:t>10/25/2019</a:t>
             </a:fld>
             <a:endParaRPr lang="en-US"/>
           </a:p>
@@ -8031,7 +8061,7 @@
           <a:p>
             <a:fld id="{727058FD-3824-4FB5-9AE4-A6CC1A9B7AAD}" type="datetime1">
               <a:rPr lang="en-US" smtClean="0"/>
-              <a:t>10/21/2019</a:t>
+              <a:t>10/25/2019</a:t>
             </a:fld>
             <a:endParaRPr lang="en-US"/>
           </a:p>
@@ -8266,7 +8296,7 @@
           <a:p>
             <a:fld id="{7A24BCAB-111E-4282-A449-2EF28C5EB72A}" type="datetime1">
               <a:rPr lang="en-US" smtClean="0"/>
-              <a:t>10/21/2019</a:t>
+              <a:t>10/25/2019</a:t>
             </a:fld>
             <a:endParaRPr lang="en-US"/>
           </a:p>
@@ -8495,7 +8525,7 @@
           <a:p>
             <a:fld id="{AA60836D-DAAE-45D6-9DDC-52F691BC7583}" type="datetime1">
               <a:rPr lang="en-US" smtClean="0"/>
-              <a:t>10/21/2019</a:t>
+              <a:t>10/25/2019</a:t>
             </a:fld>
             <a:endParaRPr lang="en-US"/>
           </a:p>
@@ -8693,7 +8723,7 @@
           <a:p>
             <a:fld id="{149F5807-4BC0-45A5-B3E9-6CA952D5C933}" type="datetime1">
               <a:rPr lang="en-US" smtClean="0"/>
-              <a:t>10/21/2019</a:t>
+              <a:t>10/25/2019</a:t>
             </a:fld>
             <a:endParaRPr lang="en-US"/>
           </a:p>
@@ -8968,7 +8998,7 @@
           <a:p>
             <a:fld id="{A0FCDBDF-64E8-4F36-98F4-88950E9880F7}" type="datetime1">
               <a:rPr lang="en-US" smtClean="0"/>
-              <a:t>10/21/2019</a:t>
+              <a:t>10/25/2019</a:t>
             </a:fld>
             <a:endParaRPr lang="en-US"/>
           </a:p>
@@ -9233,7 +9263,7 @@
           <a:p>
             <a:fld id="{7CB3145A-CBAE-48A7-B0C9-5A3E0810C82B}" type="datetime1">
               <a:rPr lang="en-US" smtClean="0"/>
-              <a:t>10/21/2019</a:t>
+              <a:t>10/25/2019</a:t>
             </a:fld>
             <a:endParaRPr lang="en-US"/>
           </a:p>
@@ -9645,7 +9675,7 @@
           <a:p>
             <a:fld id="{00B64DB6-AB84-4CF0-B71D-48D4480FE948}" type="datetime1">
               <a:rPr lang="en-US" smtClean="0"/>
-              <a:t>10/21/2019</a:t>
+              <a:t>10/25/2019</a:t>
             </a:fld>
             <a:endParaRPr lang="en-US"/>
           </a:p>
@@ -9786,7 +9816,7 @@
           <a:p>
             <a:fld id="{D415C05B-9112-4873-8037-57B0A0CED3EF}" type="datetime1">
               <a:rPr lang="en-US" smtClean="0"/>
-              <a:t>10/21/2019</a:t>
+              <a:t>10/25/2019</a:t>
             </a:fld>
             <a:endParaRPr lang="en-US"/>
           </a:p>
@@ -9899,7 +9929,7 @@
           <a:p>
             <a:fld id="{4C8EB5D5-35BA-40B2-BC55-00116B901B52}" type="datetime1">
               <a:rPr lang="en-US" smtClean="0"/>
-              <a:t>10/21/2019</a:t>
+              <a:t>10/25/2019</a:t>
             </a:fld>
             <a:endParaRPr lang="en-US"/>
           </a:p>
@@ -10210,7 +10240,7 @@
           <a:p>
             <a:fld id="{73B095DD-A2C4-4DA7-B10F-20763E0C0761}" type="datetime1">
               <a:rPr lang="en-US" smtClean="0"/>
-              <a:t>10/21/2019</a:t>
+              <a:t>10/25/2019</a:t>
             </a:fld>
             <a:endParaRPr lang="en-US"/>
           </a:p>
@@ -10441,7 +10471,7 @@
           <a:p>
             <a:fld id="{91E803D8-04AD-4737-A248-75705225C885}" type="datetime1">
               <a:rPr lang="en-US" smtClean="0"/>
-              <a:t>10/21/2019</a:t>
+              <a:t>10/25/2019</a:t>
             </a:fld>
             <a:endParaRPr lang="en-US"/>
           </a:p>
@@ -10722,7 +10752,7 @@
           <a:p>
             <a:fld id="{5E95AED6-2C55-43D2-A235-FBA5B568C86A}" type="datetime1">
               <a:rPr lang="en-US" smtClean="0"/>
-              <a:t>10/21/2019</a:t>
+              <a:t>10/25/2019</a:t>
             </a:fld>
             <a:endParaRPr lang="en-US"/>
           </a:p>
@@ -10920,7 +10950,7 @@
           <a:p>
             <a:fld id="{E2CD7E38-15D3-4463-9E82-F74ED3E096F8}" type="datetime1">
               <a:rPr lang="en-US" smtClean="0"/>
-              <a:t>10/21/2019</a:t>
+              <a:t>10/25/2019</a:t>
             </a:fld>
             <a:endParaRPr lang="en-US"/>
           </a:p>
@@ -11128,7 +11158,7 @@
           <a:p>
             <a:fld id="{D8B77A1A-D7B5-4E43-B08B-C345F91BCD62}" type="datetime1">
               <a:rPr lang="en-US" smtClean="0"/>
-              <a:t>10/21/2019</a:t>
+              <a:t>10/25/2019</a:t>
             </a:fld>
             <a:endParaRPr lang="en-US"/>
           </a:p>
@@ -11348,7 +11378,7 @@
           <a:p>
             <a:fld id="{7430F752-0657-44A9-806E-B47FE8B4BDED}" type="datetime1">
               <a:rPr lang="en-US" smtClean="0"/>
-              <a:t>10/21/2019</a:t>
+              <a:t>10/25/2019</a:t>
             </a:fld>
             <a:endParaRPr lang="en-US"/>
           </a:p>
@@ -11546,7 +11576,7 @@
           <a:p>
             <a:fld id="{D24A07EB-5143-4591-B225-A8F7E7F85563}" type="datetime1">
               <a:rPr lang="en-US" smtClean="0"/>
-              <a:t>10/21/2019</a:t>
+              <a:t>10/25/2019</a:t>
             </a:fld>
             <a:endParaRPr lang="en-US"/>
           </a:p>
@@ -11821,7 +11851,7 @@
           <a:p>
             <a:fld id="{F17D789A-CF5D-4815-BC7F-8EA94FDDB5DB}" type="datetime1">
               <a:rPr lang="en-US" smtClean="0"/>
-              <a:t>10/21/2019</a:t>
+              <a:t>10/25/2019</a:t>
             </a:fld>
             <a:endParaRPr lang="en-US"/>
           </a:p>
@@ -12086,7 +12116,7 @@
           <a:p>
             <a:fld id="{939FF65E-A896-4ABA-9544-AC006FD6AD09}" type="datetime1">
               <a:rPr lang="en-US" smtClean="0"/>
-              <a:t>10/21/2019</a:t>
+              <a:t>10/25/2019</a:t>
             </a:fld>
             <a:endParaRPr lang="en-US"/>
           </a:p>
@@ -12498,7 +12528,7 @@
           <a:p>
             <a:fld id="{F5593940-486B-4DE1-A0B1-0137E5DFAE94}" type="datetime1">
               <a:rPr lang="en-US" smtClean="0"/>
-              <a:t>10/21/2019</a:t>
+              <a:t>10/25/2019</a:t>
             </a:fld>
             <a:endParaRPr lang="en-US"/>
           </a:p>
@@ -12639,7 +12669,7 @@
           <a:p>
             <a:fld id="{3223B173-D806-4DD6-BEA2-131D1CBBCD80}" type="datetime1">
               <a:rPr lang="en-US" smtClean="0"/>
-              <a:t>10/21/2019</a:t>
+              <a:t>10/25/2019</a:t>
             </a:fld>
             <a:endParaRPr lang="en-US"/>
           </a:p>
@@ -12752,7 +12782,7 @@
           <a:p>
             <a:fld id="{471A6B96-13E7-4E46-964C-9D5327C782AA}" type="datetime1">
               <a:rPr lang="en-US" smtClean="0"/>
-              <a:t>10/21/2019</a:t>
+              <a:t>10/25/2019</a:t>
             </a:fld>
             <a:endParaRPr lang="en-US"/>
           </a:p>
@@ -13066,7 +13096,7 @@
           <a:p>
             <a:fld id="{268B9A6A-52CC-415C-A8D4-9572A798725F}" type="datetime1">
               <a:rPr lang="en-US" smtClean="0"/>
-              <a:t>10/21/2019</a:t>
+              <a:t>10/25/2019</a:t>
             </a:fld>
             <a:endParaRPr lang="en-US"/>
           </a:p>
@@ -13387,7 +13417,7 @@
           <a:p>
             <a:fld id="{43102412-0D74-4ACC-B7AF-F2FA0C555365}" type="datetime1">
               <a:rPr lang="en-US" smtClean="0"/>
-              <a:t>10/21/2019</a:t>
+              <a:t>10/25/2019</a:t>
             </a:fld>
             <a:endParaRPr lang="en-US"/>
           </a:p>
@@ -13675,7 +13705,7 @@
           <a:p>
             <a:fld id="{B1DCF461-7620-4730-BBC4-25FC54014689}" type="datetime1">
               <a:rPr lang="en-US" smtClean="0"/>
-              <a:t>10/21/2019</a:t>
+              <a:t>10/25/2019</a:t>
             </a:fld>
             <a:endParaRPr lang="en-US"/>
           </a:p>
@@ -13873,7 +13903,7 @@
           <a:p>
             <a:fld id="{410E3CC5-B444-4BD3-BD6F-22DF1DADAFBF}" type="datetime1">
               <a:rPr lang="en-US" smtClean="0"/>
-              <a:t>10/21/2019</a:t>
+              <a:t>10/25/2019</a:t>
             </a:fld>
             <a:endParaRPr lang="en-US"/>
           </a:p>
@@ -14081,7 +14111,7 @@
           <a:p>
             <a:fld id="{0F8EBB85-1D5E-427E-B375-0CF5BEE4EB4A}" type="datetime1">
               <a:rPr lang="en-US" smtClean="0"/>
-              <a:t>10/21/2019</a:t>
+              <a:t>10/25/2019</a:t>
             </a:fld>
             <a:endParaRPr lang="en-US"/>
           </a:p>
@@ -14145,6 +14175,1517 @@
     <p:extLst>
       <p:ext uri="{BB962C8B-B14F-4D97-AF65-F5344CB8AC3E}">
         <p14:creationId xmlns:p14="http://schemas.microsoft.com/office/powerpoint/2010/main" val="1428050144"/>
+      </p:ext>
+    </p:extLst>
+  </p:cSld>
+  <p:clrMapOvr>
+    <a:masterClrMapping/>
+  </p:clrMapOvr>
+</p:sldLayout>
+</file>
+
+<file path=ppt/slideLayouts/slideLayout34.xml><?xml version="1.0" encoding="utf-8"?>
+<p:sldLayout xmlns:a="http://schemas.openxmlformats.org/drawingml/2006/main" xmlns:r="http://schemas.openxmlformats.org/officeDocument/2006/relationships" xmlns:p="http://schemas.openxmlformats.org/presentationml/2006/main" type="title" preserve="1">
+  <p:cSld name="Title Slide">
+    <p:spTree>
+      <p:nvGrpSpPr>
+        <p:cNvPr id="1" name=""/>
+        <p:cNvGrpSpPr/>
+        <p:nvPr/>
+      </p:nvGrpSpPr>
+      <p:grpSpPr>
+        <a:xfrm>
+          <a:off x="0" y="0"/>
+          <a:ext cx="0" cy="0"/>
+          <a:chOff x="0" y="0"/>
+          <a:chExt cx="0" cy="0"/>
+        </a:xfrm>
+      </p:grpSpPr>
+      <p:sp>
+        <p:nvSpPr>
+          <p:cNvPr id="2" name="Title 1">
+            <a:extLst>
+              <a:ext uri="{FF2B5EF4-FFF2-40B4-BE49-F238E27FC236}">
+                <a16:creationId xmlns:a16="http://schemas.microsoft.com/office/drawing/2014/main" id="{4F0A437B-34AF-6449-A87C-96757217F632}"/>
+              </a:ext>
+            </a:extLst>
+          </p:cNvPr>
+          <p:cNvSpPr>
+            <a:spLocks noGrp="1"/>
+          </p:cNvSpPr>
+          <p:nvPr>
+            <p:ph type="ctrTitle"/>
+          </p:nvPr>
+        </p:nvSpPr>
+        <p:spPr>
+          <a:xfrm>
+            <a:off x="1524000" y="1122363"/>
+            <a:ext cx="9144000" cy="2387600"/>
+          </a:xfrm>
+        </p:spPr>
+        <p:txBody>
+          <a:bodyPr anchor="b"/>
+          <a:lstStyle>
+            <a:lvl1pPr algn="ctr">
+              <a:defRPr sz="6000"/>
+            </a:lvl1pPr>
+          </a:lstStyle>
+          <a:p>
+            <a:r>
+              <a:rPr lang="en-US"/>
+              <a:t>Click to edit Master title style</a:t>
+            </a:r>
+          </a:p>
+        </p:txBody>
+      </p:sp>
+      <p:sp>
+        <p:nvSpPr>
+          <p:cNvPr id="3" name="Subtitle 2">
+            <a:extLst>
+              <a:ext uri="{FF2B5EF4-FFF2-40B4-BE49-F238E27FC236}">
+                <a16:creationId xmlns:a16="http://schemas.microsoft.com/office/drawing/2014/main" id="{A64B9C91-E211-2F49-A2C4-7C04CBC43A02}"/>
+              </a:ext>
+            </a:extLst>
+          </p:cNvPr>
+          <p:cNvSpPr>
+            <a:spLocks noGrp="1"/>
+          </p:cNvSpPr>
+          <p:nvPr>
+            <p:ph type="subTitle" idx="1"/>
+          </p:nvPr>
+        </p:nvSpPr>
+        <p:spPr>
+          <a:xfrm>
+            <a:off x="1524000" y="3602038"/>
+            <a:ext cx="9144000" cy="1655762"/>
+          </a:xfrm>
+        </p:spPr>
+        <p:txBody>
+          <a:bodyPr/>
+          <a:lstStyle>
+            <a:lvl1pPr marL="0" indent="0" algn="ctr">
+              <a:buNone/>
+              <a:defRPr sz="2400"/>
+            </a:lvl1pPr>
+            <a:lvl2pPr marL="457200" indent="0" algn="ctr">
+              <a:buNone/>
+              <a:defRPr sz="2000"/>
+            </a:lvl2pPr>
+            <a:lvl3pPr marL="914400" indent="0" algn="ctr">
+              <a:buNone/>
+              <a:defRPr sz="1800"/>
+            </a:lvl3pPr>
+            <a:lvl4pPr marL="1371600" indent="0" algn="ctr">
+              <a:buNone/>
+              <a:defRPr sz="1600"/>
+            </a:lvl4pPr>
+            <a:lvl5pPr marL="1828800" indent="0" algn="ctr">
+              <a:buNone/>
+              <a:defRPr sz="1600"/>
+            </a:lvl5pPr>
+            <a:lvl6pPr marL="2286000" indent="0" algn="ctr">
+              <a:buNone/>
+              <a:defRPr sz="1600"/>
+            </a:lvl6pPr>
+            <a:lvl7pPr marL="2743200" indent="0" algn="ctr">
+              <a:buNone/>
+              <a:defRPr sz="1600"/>
+            </a:lvl7pPr>
+            <a:lvl8pPr marL="3200400" indent="0" algn="ctr">
+              <a:buNone/>
+              <a:defRPr sz="1600"/>
+            </a:lvl8pPr>
+            <a:lvl9pPr marL="3657600" indent="0" algn="ctr">
+              <a:buNone/>
+              <a:defRPr sz="1600"/>
+            </a:lvl9pPr>
+          </a:lstStyle>
+          <a:p>
+            <a:r>
+              <a:rPr lang="en-US"/>
+              <a:t>Click to edit Master subtitle style</a:t>
+            </a:r>
+          </a:p>
+        </p:txBody>
+      </p:sp>
+      <p:sp>
+        <p:nvSpPr>
+          <p:cNvPr id="4" name="Date Placeholder 3">
+            <a:extLst>
+              <a:ext uri="{FF2B5EF4-FFF2-40B4-BE49-F238E27FC236}">
+                <a16:creationId xmlns:a16="http://schemas.microsoft.com/office/drawing/2014/main" id="{74845A26-EB49-714D-8202-4161ABE70FDD}"/>
+              </a:ext>
+            </a:extLst>
+          </p:cNvPr>
+          <p:cNvSpPr>
+            <a:spLocks noGrp="1"/>
+          </p:cNvSpPr>
+          <p:nvPr>
+            <p:ph type="dt" sz="half" idx="10"/>
+          </p:nvPr>
+        </p:nvSpPr>
+        <p:spPr/>
+        <p:txBody>
+          <a:bodyPr/>
+          <a:lstStyle/>
+          <a:p>
+            <a:fld id="{CDF30110-5C13-E247-99EA-786A70736B50}" type="datetimeFigureOut">
+              <a:rPr lang="en-US" smtClean="0"/>
+              <a:t>10/25/2019</a:t>
+            </a:fld>
+            <a:endParaRPr lang="en-US"/>
+          </a:p>
+        </p:txBody>
+      </p:sp>
+      <p:sp>
+        <p:nvSpPr>
+          <p:cNvPr id="5" name="Footer Placeholder 4">
+            <a:extLst>
+              <a:ext uri="{FF2B5EF4-FFF2-40B4-BE49-F238E27FC236}">
+                <a16:creationId xmlns:a16="http://schemas.microsoft.com/office/drawing/2014/main" id="{F4B41844-79D5-FA49-B5F4-B0A155C7E84D}"/>
+              </a:ext>
+            </a:extLst>
+          </p:cNvPr>
+          <p:cNvSpPr>
+            <a:spLocks noGrp="1"/>
+          </p:cNvSpPr>
+          <p:nvPr>
+            <p:ph type="ftr" sz="quarter" idx="11"/>
+          </p:nvPr>
+        </p:nvSpPr>
+        <p:spPr/>
+        <p:txBody>
+          <a:bodyPr/>
+          <a:lstStyle/>
+          <a:p>
+            <a:endParaRPr lang="en-US"/>
+          </a:p>
+        </p:txBody>
+      </p:sp>
+      <p:sp>
+        <p:nvSpPr>
+          <p:cNvPr id="6" name="Slide Number Placeholder 5">
+            <a:extLst>
+              <a:ext uri="{FF2B5EF4-FFF2-40B4-BE49-F238E27FC236}">
+                <a16:creationId xmlns:a16="http://schemas.microsoft.com/office/drawing/2014/main" id="{4B4A90FE-64CB-4B4B-B0E6-24E535BCC718}"/>
+              </a:ext>
+            </a:extLst>
+          </p:cNvPr>
+          <p:cNvSpPr>
+            <a:spLocks noGrp="1"/>
+          </p:cNvSpPr>
+          <p:nvPr>
+            <p:ph type="sldNum" sz="quarter" idx="12"/>
+          </p:nvPr>
+        </p:nvSpPr>
+        <p:spPr/>
+        <p:txBody>
+          <a:bodyPr/>
+          <a:lstStyle/>
+          <a:p>
+            <a:fld id="{2F9F84BD-624A-0641-BF00-D8F88E0B8B4D}" type="slidenum">
+              <a:rPr lang="en-US" smtClean="0"/>
+              <a:t>‹#›</a:t>
+            </a:fld>
+            <a:endParaRPr lang="en-US"/>
+          </a:p>
+        </p:txBody>
+      </p:sp>
+    </p:spTree>
+    <p:extLst>
+      <p:ext uri="{BB962C8B-B14F-4D97-AF65-F5344CB8AC3E}">
+        <p14:creationId xmlns:p14="http://schemas.microsoft.com/office/powerpoint/2010/main" val="3435976092"/>
+      </p:ext>
+    </p:extLst>
+  </p:cSld>
+  <p:clrMapOvr>
+    <a:masterClrMapping/>
+  </p:clrMapOvr>
+</p:sldLayout>
+</file>
+
+<file path=ppt/slideLayouts/slideLayout35.xml><?xml version="1.0" encoding="utf-8"?>
+<p:sldLayout xmlns:a="http://schemas.openxmlformats.org/drawingml/2006/main" xmlns:r="http://schemas.openxmlformats.org/officeDocument/2006/relationships" xmlns:p="http://schemas.openxmlformats.org/presentationml/2006/main" type="obj" preserve="1">
+  <p:cSld name="Title and Content">
+    <p:spTree>
+      <p:nvGrpSpPr>
+        <p:cNvPr id="1" name=""/>
+        <p:cNvGrpSpPr/>
+        <p:nvPr/>
+      </p:nvGrpSpPr>
+      <p:grpSpPr>
+        <a:xfrm>
+          <a:off x="0" y="0"/>
+          <a:ext cx="0" cy="0"/>
+          <a:chOff x="0" y="0"/>
+          <a:chExt cx="0" cy="0"/>
+        </a:xfrm>
+      </p:grpSpPr>
+      <p:sp>
+        <p:nvSpPr>
+          <p:cNvPr id="2" name="Title 1">
+            <a:extLst>
+              <a:ext uri="{FF2B5EF4-FFF2-40B4-BE49-F238E27FC236}">
+                <a16:creationId xmlns:a16="http://schemas.microsoft.com/office/drawing/2014/main" id="{0EB594FB-F463-9D42-9530-CCF5B608255B}"/>
+              </a:ext>
+            </a:extLst>
+          </p:cNvPr>
+          <p:cNvSpPr>
+            <a:spLocks noGrp="1"/>
+          </p:cNvSpPr>
+          <p:nvPr>
+            <p:ph type="title"/>
+          </p:nvPr>
+        </p:nvSpPr>
+        <p:spPr/>
+        <p:txBody>
+          <a:bodyPr/>
+          <a:lstStyle/>
+          <a:p>
+            <a:r>
+              <a:rPr lang="en-US"/>
+              <a:t>Click to edit Master title style</a:t>
+            </a:r>
+          </a:p>
+        </p:txBody>
+      </p:sp>
+      <p:sp>
+        <p:nvSpPr>
+          <p:cNvPr id="3" name="Content Placeholder 2">
+            <a:extLst>
+              <a:ext uri="{FF2B5EF4-FFF2-40B4-BE49-F238E27FC236}">
+                <a16:creationId xmlns:a16="http://schemas.microsoft.com/office/drawing/2014/main" id="{35CC89F4-11A7-F246-94B7-991B1EDBB2BA}"/>
+              </a:ext>
+            </a:extLst>
+          </p:cNvPr>
+          <p:cNvSpPr>
+            <a:spLocks noGrp="1"/>
+          </p:cNvSpPr>
+          <p:nvPr>
+            <p:ph idx="1"/>
+          </p:nvPr>
+        </p:nvSpPr>
+        <p:spPr/>
+        <p:txBody>
+          <a:bodyPr/>
+          <a:lstStyle/>
+          <a:p>
+            <a:pPr lvl="0"/>
+            <a:r>
+              <a:rPr lang="en-US"/>
+              <a:t>Click to edit Master text styles</a:t>
+            </a:r>
+          </a:p>
+          <a:p>
+            <a:pPr lvl="1"/>
+            <a:r>
+              <a:rPr lang="en-US"/>
+              <a:t>Second level</a:t>
+            </a:r>
+          </a:p>
+          <a:p>
+            <a:pPr lvl="2"/>
+            <a:r>
+              <a:rPr lang="en-US"/>
+              <a:t>Third level</a:t>
+            </a:r>
+          </a:p>
+          <a:p>
+            <a:pPr lvl="3"/>
+            <a:r>
+              <a:rPr lang="en-US"/>
+              <a:t>Fourth level</a:t>
+            </a:r>
+          </a:p>
+          <a:p>
+            <a:pPr lvl="4"/>
+            <a:r>
+              <a:rPr lang="en-US"/>
+              <a:t>Fifth level</a:t>
+            </a:r>
+          </a:p>
+        </p:txBody>
+      </p:sp>
+      <p:sp>
+        <p:nvSpPr>
+          <p:cNvPr id="4" name="Date Placeholder 3">
+            <a:extLst>
+              <a:ext uri="{FF2B5EF4-FFF2-40B4-BE49-F238E27FC236}">
+                <a16:creationId xmlns:a16="http://schemas.microsoft.com/office/drawing/2014/main" id="{019F78DA-13B9-BD4C-A2ED-8A517E11D6AB}"/>
+              </a:ext>
+            </a:extLst>
+          </p:cNvPr>
+          <p:cNvSpPr>
+            <a:spLocks noGrp="1"/>
+          </p:cNvSpPr>
+          <p:nvPr>
+            <p:ph type="dt" sz="half" idx="10"/>
+          </p:nvPr>
+        </p:nvSpPr>
+        <p:spPr/>
+        <p:txBody>
+          <a:bodyPr/>
+          <a:lstStyle/>
+          <a:p>
+            <a:fld id="{CDF30110-5C13-E247-99EA-786A70736B50}" type="datetimeFigureOut">
+              <a:rPr lang="en-US" smtClean="0"/>
+              <a:t>10/25/2019</a:t>
+            </a:fld>
+            <a:endParaRPr lang="en-US"/>
+          </a:p>
+        </p:txBody>
+      </p:sp>
+      <p:sp>
+        <p:nvSpPr>
+          <p:cNvPr id="5" name="Footer Placeholder 4">
+            <a:extLst>
+              <a:ext uri="{FF2B5EF4-FFF2-40B4-BE49-F238E27FC236}">
+                <a16:creationId xmlns:a16="http://schemas.microsoft.com/office/drawing/2014/main" id="{20E64FA0-246F-DA46-A48D-72438CEDDE05}"/>
+              </a:ext>
+            </a:extLst>
+          </p:cNvPr>
+          <p:cNvSpPr>
+            <a:spLocks noGrp="1"/>
+          </p:cNvSpPr>
+          <p:nvPr>
+            <p:ph type="ftr" sz="quarter" idx="11"/>
+          </p:nvPr>
+        </p:nvSpPr>
+        <p:spPr/>
+        <p:txBody>
+          <a:bodyPr/>
+          <a:lstStyle/>
+          <a:p>
+            <a:endParaRPr lang="en-US"/>
+          </a:p>
+        </p:txBody>
+      </p:sp>
+      <p:sp>
+        <p:nvSpPr>
+          <p:cNvPr id="6" name="Slide Number Placeholder 5">
+            <a:extLst>
+              <a:ext uri="{FF2B5EF4-FFF2-40B4-BE49-F238E27FC236}">
+                <a16:creationId xmlns:a16="http://schemas.microsoft.com/office/drawing/2014/main" id="{0B70A288-57D3-FD40-8BA8-A467171E5B75}"/>
+              </a:ext>
+            </a:extLst>
+          </p:cNvPr>
+          <p:cNvSpPr>
+            <a:spLocks noGrp="1"/>
+          </p:cNvSpPr>
+          <p:nvPr>
+            <p:ph type="sldNum" sz="quarter" idx="12"/>
+          </p:nvPr>
+        </p:nvSpPr>
+        <p:spPr/>
+        <p:txBody>
+          <a:bodyPr/>
+          <a:lstStyle/>
+          <a:p>
+            <a:fld id="{2F9F84BD-624A-0641-BF00-D8F88E0B8B4D}" type="slidenum">
+              <a:rPr lang="en-US" smtClean="0"/>
+              <a:t>‹#›</a:t>
+            </a:fld>
+            <a:endParaRPr lang="en-US"/>
+          </a:p>
+        </p:txBody>
+      </p:sp>
+    </p:spTree>
+    <p:extLst>
+      <p:ext uri="{BB962C8B-B14F-4D97-AF65-F5344CB8AC3E}">
+        <p14:creationId xmlns:p14="http://schemas.microsoft.com/office/powerpoint/2010/main" val="2599706048"/>
+      </p:ext>
+    </p:extLst>
+  </p:cSld>
+  <p:clrMapOvr>
+    <a:masterClrMapping/>
+  </p:clrMapOvr>
+</p:sldLayout>
+</file>
+
+<file path=ppt/slideLayouts/slideLayout36.xml><?xml version="1.0" encoding="utf-8"?>
+<p:sldLayout xmlns:a="http://schemas.openxmlformats.org/drawingml/2006/main" xmlns:r="http://schemas.openxmlformats.org/officeDocument/2006/relationships" xmlns:p="http://schemas.openxmlformats.org/presentationml/2006/main" type="secHead" preserve="1">
+  <p:cSld name="Section Header">
+    <p:spTree>
+      <p:nvGrpSpPr>
+        <p:cNvPr id="1" name=""/>
+        <p:cNvGrpSpPr/>
+        <p:nvPr/>
+      </p:nvGrpSpPr>
+      <p:grpSpPr>
+        <a:xfrm>
+          <a:off x="0" y="0"/>
+          <a:ext cx="0" cy="0"/>
+          <a:chOff x="0" y="0"/>
+          <a:chExt cx="0" cy="0"/>
+        </a:xfrm>
+      </p:grpSpPr>
+      <p:sp>
+        <p:nvSpPr>
+          <p:cNvPr id="2" name="Title 1">
+            <a:extLst>
+              <a:ext uri="{FF2B5EF4-FFF2-40B4-BE49-F238E27FC236}">
+                <a16:creationId xmlns:a16="http://schemas.microsoft.com/office/drawing/2014/main" id="{AB8041E4-CFE4-5945-8C09-D2FC1618A93C}"/>
+              </a:ext>
+            </a:extLst>
+          </p:cNvPr>
+          <p:cNvSpPr>
+            <a:spLocks noGrp="1"/>
+          </p:cNvSpPr>
+          <p:nvPr>
+            <p:ph type="title"/>
+          </p:nvPr>
+        </p:nvSpPr>
+        <p:spPr>
+          <a:xfrm>
+            <a:off x="831850" y="1709738"/>
+            <a:ext cx="10515600" cy="2852737"/>
+          </a:xfrm>
+        </p:spPr>
+        <p:txBody>
+          <a:bodyPr anchor="b"/>
+          <a:lstStyle>
+            <a:lvl1pPr>
+              <a:defRPr sz="6000"/>
+            </a:lvl1pPr>
+          </a:lstStyle>
+          <a:p>
+            <a:r>
+              <a:rPr lang="en-US"/>
+              <a:t>Click to edit Master title style</a:t>
+            </a:r>
+          </a:p>
+        </p:txBody>
+      </p:sp>
+      <p:sp>
+        <p:nvSpPr>
+          <p:cNvPr id="3" name="Text Placeholder 2">
+            <a:extLst>
+              <a:ext uri="{FF2B5EF4-FFF2-40B4-BE49-F238E27FC236}">
+                <a16:creationId xmlns:a16="http://schemas.microsoft.com/office/drawing/2014/main" id="{D7B7FD2E-C1B8-3E4D-8841-1C94F4D29BA3}"/>
+              </a:ext>
+            </a:extLst>
+          </p:cNvPr>
+          <p:cNvSpPr>
+            <a:spLocks noGrp="1"/>
+          </p:cNvSpPr>
+          <p:nvPr>
+            <p:ph type="body" idx="1"/>
+          </p:nvPr>
+        </p:nvSpPr>
+        <p:spPr>
+          <a:xfrm>
+            <a:off x="831850" y="4589463"/>
+            <a:ext cx="10515600" cy="1500187"/>
+          </a:xfrm>
+        </p:spPr>
+        <p:txBody>
+          <a:bodyPr/>
+          <a:lstStyle>
+            <a:lvl1pPr marL="0" indent="0">
+              <a:buNone/>
+              <a:defRPr sz="2400">
+                <a:solidFill>
+                  <a:schemeClr val="tx1">
+                    <a:tint val="75000"/>
+                  </a:schemeClr>
+                </a:solidFill>
+              </a:defRPr>
+            </a:lvl1pPr>
+            <a:lvl2pPr marL="457200" indent="0">
+              <a:buNone/>
+              <a:defRPr sz="2000">
+                <a:solidFill>
+                  <a:schemeClr val="tx1">
+                    <a:tint val="75000"/>
+                  </a:schemeClr>
+                </a:solidFill>
+              </a:defRPr>
+            </a:lvl2pPr>
+            <a:lvl3pPr marL="914400" indent="0">
+              <a:buNone/>
+              <a:defRPr sz="1800">
+                <a:solidFill>
+                  <a:schemeClr val="tx1">
+                    <a:tint val="75000"/>
+                  </a:schemeClr>
+                </a:solidFill>
+              </a:defRPr>
+            </a:lvl3pPr>
+            <a:lvl4pPr marL="1371600" indent="0">
+              <a:buNone/>
+              <a:defRPr sz="1600">
+                <a:solidFill>
+                  <a:schemeClr val="tx1">
+                    <a:tint val="75000"/>
+                  </a:schemeClr>
+                </a:solidFill>
+              </a:defRPr>
+            </a:lvl4pPr>
+            <a:lvl5pPr marL="1828800" indent="0">
+              <a:buNone/>
+              <a:defRPr sz="1600">
+                <a:solidFill>
+                  <a:schemeClr val="tx1">
+                    <a:tint val="75000"/>
+                  </a:schemeClr>
+                </a:solidFill>
+              </a:defRPr>
+            </a:lvl5pPr>
+            <a:lvl6pPr marL="2286000" indent="0">
+              <a:buNone/>
+              <a:defRPr sz="1600">
+                <a:solidFill>
+                  <a:schemeClr val="tx1">
+                    <a:tint val="75000"/>
+                  </a:schemeClr>
+                </a:solidFill>
+              </a:defRPr>
+            </a:lvl6pPr>
+            <a:lvl7pPr marL="2743200" indent="0">
+              <a:buNone/>
+              <a:defRPr sz="1600">
+                <a:solidFill>
+                  <a:schemeClr val="tx1">
+                    <a:tint val="75000"/>
+                  </a:schemeClr>
+                </a:solidFill>
+              </a:defRPr>
+            </a:lvl7pPr>
+            <a:lvl8pPr marL="3200400" indent="0">
+              <a:buNone/>
+              <a:defRPr sz="1600">
+                <a:solidFill>
+                  <a:schemeClr val="tx1">
+                    <a:tint val="75000"/>
+                  </a:schemeClr>
+                </a:solidFill>
+              </a:defRPr>
+            </a:lvl8pPr>
+            <a:lvl9pPr marL="3657600" indent="0">
+              <a:buNone/>
+              <a:defRPr sz="1600">
+                <a:solidFill>
+                  <a:schemeClr val="tx1">
+                    <a:tint val="75000"/>
+                  </a:schemeClr>
+                </a:solidFill>
+              </a:defRPr>
+            </a:lvl9pPr>
+          </a:lstStyle>
+          <a:p>
+            <a:pPr lvl="0"/>
+            <a:r>
+              <a:rPr lang="en-US"/>
+              <a:t>Click to edit Master text styles</a:t>
+            </a:r>
+          </a:p>
+        </p:txBody>
+      </p:sp>
+      <p:sp>
+        <p:nvSpPr>
+          <p:cNvPr id="4" name="Date Placeholder 3">
+            <a:extLst>
+              <a:ext uri="{FF2B5EF4-FFF2-40B4-BE49-F238E27FC236}">
+                <a16:creationId xmlns:a16="http://schemas.microsoft.com/office/drawing/2014/main" id="{69D2F216-D1F5-B74B-ACD6-C69AE9C83AAB}"/>
+              </a:ext>
+            </a:extLst>
+          </p:cNvPr>
+          <p:cNvSpPr>
+            <a:spLocks noGrp="1"/>
+          </p:cNvSpPr>
+          <p:nvPr>
+            <p:ph type="dt" sz="half" idx="10"/>
+          </p:nvPr>
+        </p:nvSpPr>
+        <p:spPr/>
+        <p:txBody>
+          <a:bodyPr/>
+          <a:lstStyle/>
+          <a:p>
+            <a:fld id="{CDF30110-5C13-E247-99EA-786A70736B50}" type="datetimeFigureOut">
+              <a:rPr lang="en-US" smtClean="0"/>
+              <a:t>10/25/2019</a:t>
+            </a:fld>
+            <a:endParaRPr lang="en-US"/>
+          </a:p>
+        </p:txBody>
+      </p:sp>
+      <p:sp>
+        <p:nvSpPr>
+          <p:cNvPr id="5" name="Footer Placeholder 4">
+            <a:extLst>
+              <a:ext uri="{FF2B5EF4-FFF2-40B4-BE49-F238E27FC236}">
+                <a16:creationId xmlns:a16="http://schemas.microsoft.com/office/drawing/2014/main" id="{CF7B6FE5-D990-9649-A18B-A47A1B3C8A18}"/>
+              </a:ext>
+            </a:extLst>
+          </p:cNvPr>
+          <p:cNvSpPr>
+            <a:spLocks noGrp="1"/>
+          </p:cNvSpPr>
+          <p:nvPr>
+            <p:ph type="ftr" sz="quarter" idx="11"/>
+          </p:nvPr>
+        </p:nvSpPr>
+        <p:spPr/>
+        <p:txBody>
+          <a:bodyPr/>
+          <a:lstStyle/>
+          <a:p>
+            <a:endParaRPr lang="en-US"/>
+          </a:p>
+        </p:txBody>
+      </p:sp>
+      <p:sp>
+        <p:nvSpPr>
+          <p:cNvPr id="6" name="Slide Number Placeholder 5">
+            <a:extLst>
+              <a:ext uri="{FF2B5EF4-FFF2-40B4-BE49-F238E27FC236}">
+                <a16:creationId xmlns:a16="http://schemas.microsoft.com/office/drawing/2014/main" id="{68A64740-EB5C-B044-BF95-C6C324658DB2}"/>
+              </a:ext>
+            </a:extLst>
+          </p:cNvPr>
+          <p:cNvSpPr>
+            <a:spLocks noGrp="1"/>
+          </p:cNvSpPr>
+          <p:nvPr>
+            <p:ph type="sldNum" sz="quarter" idx="12"/>
+          </p:nvPr>
+        </p:nvSpPr>
+        <p:spPr/>
+        <p:txBody>
+          <a:bodyPr/>
+          <a:lstStyle/>
+          <a:p>
+            <a:fld id="{2F9F84BD-624A-0641-BF00-D8F88E0B8B4D}" type="slidenum">
+              <a:rPr lang="en-US" smtClean="0"/>
+              <a:t>‹#›</a:t>
+            </a:fld>
+            <a:endParaRPr lang="en-US"/>
+          </a:p>
+        </p:txBody>
+      </p:sp>
+    </p:spTree>
+    <p:extLst>
+      <p:ext uri="{BB962C8B-B14F-4D97-AF65-F5344CB8AC3E}">
+        <p14:creationId xmlns:p14="http://schemas.microsoft.com/office/powerpoint/2010/main" val="1224848551"/>
+      </p:ext>
+    </p:extLst>
+  </p:cSld>
+  <p:clrMapOvr>
+    <a:masterClrMapping/>
+  </p:clrMapOvr>
+</p:sldLayout>
+</file>
+
+<file path=ppt/slideLayouts/slideLayout37.xml><?xml version="1.0" encoding="utf-8"?>
+<p:sldLayout xmlns:a="http://schemas.openxmlformats.org/drawingml/2006/main" xmlns:r="http://schemas.openxmlformats.org/officeDocument/2006/relationships" xmlns:p="http://schemas.openxmlformats.org/presentationml/2006/main" type="twoObj" preserve="1">
+  <p:cSld name="Two Content">
+    <p:spTree>
+      <p:nvGrpSpPr>
+        <p:cNvPr id="1" name=""/>
+        <p:cNvGrpSpPr/>
+        <p:nvPr/>
+      </p:nvGrpSpPr>
+      <p:grpSpPr>
+        <a:xfrm>
+          <a:off x="0" y="0"/>
+          <a:ext cx="0" cy="0"/>
+          <a:chOff x="0" y="0"/>
+          <a:chExt cx="0" cy="0"/>
+        </a:xfrm>
+      </p:grpSpPr>
+      <p:sp>
+        <p:nvSpPr>
+          <p:cNvPr id="2" name="Title 1">
+            <a:extLst>
+              <a:ext uri="{FF2B5EF4-FFF2-40B4-BE49-F238E27FC236}">
+                <a16:creationId xmlns:a16="http://schemas.microsoft.com/office/drawing/2014/main" id="{EBE2B6A6-B88A-8945-84B1-DB60E7DF3FDF}"/>
+              </a:ext>
+            </a:extLst>
+          </p:cNvPr>
+          <p:cNvSpPr>
+            <a:spLocks noGrp="1"/>
+          </p:cNvSpPr>
+          <p:nvPr>
+            <p:ph type="title"/>
+          </p:nvPr>
+        </p:nvSpPr>
+        <p:spPr/>
+        <p:txBody>
+          <a:bodyPr/>
+          <a:lstStyle/>
+          <a:p>
+            <a:r>
+              <a:rPr lang="en-US"/>
+              <a:t>Click to edit Master title style</a:t>
+            </a:r>
+          </a:p>
+        </p:txBody>
+      </p:sp>
+      <p:sp>
+        <p:nvSpPr>
+          <p:cNvPr id="3" name="Content Placeholder 2">
+            <a:extLst>
+              <a:ext uri="{FF2B5EF4-FFF2-40B4-BE49-F238E27FC236}">
+                <a16:creationId xmlns:a16="http://schemas.microsoft.com/office/drawing/2014/main" id="{E2D8D9CD-C2A7-5244-BD03-01A8543B7208}"/>
+              </a:ext>
+            </a:extLst>
+          </p:cNvPr>
+          <p:cNvSpPr>
+            <a:spLocks noGrp="1"/>
+          </p:cNvSpPr>
+          <p:nvPr>
+            <p:ph sz="half" idx="1"/>
+          </p:nvPr>
+        </p:nvSpPr>
+        <p:spPr>
+          <a:xfrm>
+            <a:off x="838200" y="1825625"/>
+            <a:ext cx="5181600" cy="4351338"/>
+          </a:xfrm>
+        </p:spPr>
+        <p:txBody>
+          <a:bodyPr/>
+          <a:lstStyle/>
+          <a:p>
+            <a:pPr lvl="0"/>
+            <a:r>
+              <a:rPr lang="en-US"/>
+              <a:t>Click to edit Master text styles</a:t>
+            </a:r>
+          </a:p>
+          <a:p>
+            <a:pPr lvl="1"/>
+            <a:r>
+              <a:rPr lang="en-US"/>
+              <a:t>Second level</a:t>
+            </a:r>
+          </a:p>
+          <a:p>
+            <a:pPr lvl="2"/>
+            <a:r>
+              <a:rPr lang="en-US"/>
+              <a:t>Third level</a:t>
+            </a:r>
+          </a:p>
+          <a:p>
+            <a:pPr lvl="3"/>
+            <a:r>
+              <a:rPr lang="en-US"/>
+              <a:t>Fourth level</a:t>
+            </a:r>
+          </a:p>
+          <a:p>
+            <a:pPr lvl="4"/>
+            <a:r>
+              <a:rPr lang="en-US"/>
+              <a:t>Fifth level</a:t>
+            </a:r>
+          </a:p>
+        </p:txBody>
+      </p:sp>
+      <p:sp>
+        <p:nvSpPr>
+          <p:cNvPr id="4" name="Content Placeholder 3">
+            <a:extLst>
+              <a:ext uri="{FF2B5EF4-FFF2-40B4-BE49-F238E27FC236}">
+                <a16:creationId xmlns:a16="http://schemas.microsoft.com/office/drawing/2014/main" id="{941EAD39-64BF-EB4B-A906-13A7AC560A10}"/>
+              </a:ext>
+            </a:extLst>
+          </p:cNvPr>
+          <p:cNvSpPr>
+            <a:spLocks noGrp="1"/>
+          </p:cNvSpPr>
+          <p:nvPr>
+            <p:ph sz="half" idx="2"/>
+          </p:nvPr>
+        </p:nvSpPr>
+        <p:spPr>
+          <a:xfrm>
+            <a:off x="6172200" y="1825625"/>
+            <a:ext cx="5181600" cy="4351338"/>
+          </a:xfrm>
+        </p:spPr>
+        <p:txBody>
+          <a:bodyPr/>
+          <a:lstStyle/>
+          <a:p>
+            <a:pPr lvl="0"/>
+            <a:r>
+              <a:rPr lang="en-US"/>
+              <a:t>Click to edit Master text styles</a:t>
+            </a:r>
+          </a:p>
+          <a:p>
+            <a:pPr lvl="1"/>
+            <a:r>
+              <a:rPr lang="en-US"/>
+              <a:t>Second level</a:t>
+            </a:r>
+          </a:p>
+          <a:p>
+            <a:pPr lvl="2"/>
+            <a:r>
+              <a:rPr lang="en-US"/>
+              <a:t>Third level</a:t>
+            </a:r>
+          </a:p>
+          <a:p>
+            <a:pPr lvl="3"/>
+            <a:r>
+              <a:rPr lang="en-US"/>
+              <a:t>Fourth level</a:t>
+            </a:r>
+          </a:p>
+          <a:p>
+            <a:pPr lvl="4"/>
+            <a:r>
+              <a:rPr lang="en-US"/>
+              <a:t>Fifth level</a:t>
+            </a:r>
+          </a:p>
+        </p:txBody>
+      </p:sp>
+      <p:sp>
+        <p:nvSpPr>
+          <p:cNvPr id="5" name="Date Placeholder 4">
+            <a:extLst>
+              <a:ext uri="{FF2B5EF4-FFF2-40B4-BE49-F238E27FC236}">
+                <a16:creationId xmlns:a16="http://schemas.microsoft.com/office/drawing/2014/main" id="{3D6F2122-94A0-C84C-A916-554B898B8017}"/>
+              </a:ext>
+            </a:extLst>
+          </p:cNvPr>
+          <p:cNvSpPr>
+            <a:spLocks noGrp="1"/>
+          </p:cNvSpPr>
+          <p:nvPr>
+            <p:ph type="dt" sz="half" idx="10"/>
+          </p:nvPr>
+        </p:nvSpPr>
+        <p:spPr/>
+        <p:txBody>
+          <a:bodyPr/>
+          <a:lstStyle/>
+          <a:p>
+            <a:fld id="{CDF30110-5C13-E247-99EA-786A70736B50}" type="datetimeFigureOut">
+              <a:rPr lang="en-US" smtClean="0"/>
+              <a:t>10/25/2019</a:t>
+            </a:fld>
+            <a:endParaRPr lang="en-US"/>
+          </a:p>
+        </p:txBody>
+      </p:sp>
+      <p:sp>
+        <p:nvSpPr>
+          <p:cNvPr id="6" name="Footer Placeholder 5">
+            <a:extLst>
+              <a:ext uri="{FF2B5EF4-FFF2-40B4-BE49-F238E27FC236}">
+                <a16:creationId xmlns:a16="http://schemas.microsoft.com/office/drawing/2014/main" id="{2CC0ED75-4D20-724C-B027-29ADF5EFA36F}"/>
+              </a:ext>
+            </a:extLst>
+          </p:cNvPr>
+          <p:cNvSpPr>
+            <a:spLocks noGrp="1"/>
+          </p:cNvSpPr>
+          <p:nvPr>
+            <p:ph type="ftr" sz="quarter" idx="11"/>
+          </p:nvPr>
+        </p:nvSpPr>
+        <p:spPr/>
+        <p:txBody>
+          <a:bodyPr/>
+          <a:lstStyle/>
+          <a:p>
+            <a:endParaRPr lang="en-US"/>
+          </a:p>
+        </p:txBody>
+      </p:sp>
+      <p:sp>
+        <p:nvSpPr>
+          <p:cNvPr id="7" name="Slide Number Placeholder 6">
+            <a:extLst>
+              <a:ext uri="{FF2B5EF4-FFF2-40B4-BE49-F238E27FC236}">
+                <a16:creationId xmlns:a16="http://schemas.microsoft.com/office/drawing/2014/main" id="{2172D822-546A-1740-BDF5-1ABE205B4D9C}"/>
+              </a:ext>
+            </a:extLst>
+          </p:cNvPr>
+          <p:cNvSpPr>
+            <a:spLocks noGrp="1"/>
+          </p:cNvSpPr>
+          <p:nvPr>
+            <p:ph type="sldNum" sz="quarter" idx="12"/>
+          </p:nvPr>
+        </p:nvSpPr>
+        <p:spPr/>
+        <p:txBody>
+          <a:bodyPr/>
+          <a:lstStyle/>
+          <a:p>
+            <a:fld id="{2F9F84BD-624A-0641-BF00-D8F88E0B8B4D}" type="slidenum">
+              <a:rPr lang="en-US" smtClean="0"/>
+              <a:t>‹#›</a:t>
+            </a:fld>
+            <a:endParaRPr lang="en-US"/>
+          </a:p>
+        </p:txBody>
+      </p:sp>
+    </p:spTree>
+    <p:extLst>
+      <p:ext uri="{BB962C8B-B14F-4D97-AF65-F5344CB8AC3E}">
+        <p14:creationId xmlns:p14="http://schemas.microsoft.com/office/powerpoint/2010/main" val="2359333565"/>
+      </p:ext>
+    </p:extLst>
+  </p:cSld>
+  <p:clrMapOvr>
+    <a:masterClrMapping/>
+  </p:clrMapOvr>
+</p:sldLayout>
+</file>
+
+<file path=ppt/slideLayouts/slideLayout38.xml><?xml version="1.0" encoding="utf-8"?>
+<p:sldLayout xmlns:a="http://schemas.openxmlformats.org/drawingml/2006/main" xmlns:r="http://schemas.openxmlformats.org/officeDocument/2006/relationships" xmlns:p="http://schemas.openxmlformats.org/presentationml/2006/main" type="twoTxTwoObj" preserve="1">
+  <p:cSld name="Comparison">
+    <p:spTree>
+      <p:nvGrpSpPr>
+        <p:cNvPr id="1" name=""/>
+        <p:cNvGrpSpPr/>
+        <p:nvPr/>
+      </p:nvGrpSpPr>
+      <p:grpSpPr>
+        <a:xfrm>
+          <a:off x="0" y="0"/>
+          <a:ext cx="0" cy="0"/>
+          <a:chOff x="0" y="0"/>
+          <a:chExt cx="0" cy="0"/>
+        </a:xfrm>
+      </p:grpSpPr>
+      <p:sp>
+        <p:nvSpPr>
+          <p:cNvPr id="2" name="Title 1">
+            <a:extLst>
+              <a:ext uri="{FF2B5EF4-FFF2-40B4-BE49-F238E27FC236}">
+                <a16:creationId xmlns:a16="http://schemas.microsoft.com/office/drawing/2014/main" id="{C81A763D-E996-5741-9434-AA7C5CE1B2B7}"/>
+              </a:ext>
+            </a:extLst>
+          </p:cNvPr>
+          <p:cNvSpPr>
+            <a:spLocks noGrp="1"/>
+          </p:cNvSpPr>
+          <p:nvPr>
+            <p:ph type="title"/>
+          </p:nvPr>
+        </p:nvSpPr>
+        <p:spPr>
+          <a:xfrm>
+            <a:off x="839788" y="365125"/>
+            <a:ext cx="10515600" cy="1325563"/>
+          </a:xfrm>
+        </p:spPr>
+        <p:txBody>
+          <a:bodyPr/>
+          <a:lstStyle/>
+          <a:p>
+            <a:r>
+              <a:rPr lang="en-US"/>
+              <a:t>Click to edit Master title style</a:t>
+            </a:r>
+          </a:p>
+        </p:txBody>
+      </p:sp>
+      <p:sp>
+        <p:nvSpPr>
+          <p:cNvPr id="3" name="Text Placeholder 2">
+            <a:extLst>
+              <a:ext uri="{FF2B5EF4-FFF2-40B4-BE49-F238E27FC236}">
+                <a16:creationId xmlns:a16="http://schemas.microsoft.com/office/drawing/2014/main" id="{FEB10676-E539-6D4E-87E5-5ABCC734AA47}"/>
+              </a:ext>
+            </a:extLst>
+          </p:cNvPr>
+          <p:cNvSpPr>
+            <a:spLocks noGrp="1"/>
+          </p:cNvSpPr>
+          <p:nvPr>
+            <p:ph type="body" idx="1"/>
+          </p:nvPr>
+        </p:nvSpPr>
+        <p:spPr>
+          <a:xfrm>
+            <a:off x="839788" y="1681163"/>
+            <a:ext cx="5157787" cy="823912"/>
+          </a:xfrm>
+        </p:spPr>
+        <p:txBody>
+          <a:bodyPr anchor="b"/>
+          <a:lstStyle>
+            <a:lvl1pPr marL="0" indent="0">
+              <a:buNone/>
+              <a:defRPr sz="2400" b="1"/>
+            </a:lvl1pPr>
+            <a:lvl2pPr marL="457200" indent="0">
+              <a:buNone/>
+              <a:defRPr sz="2000" b="1"/>
+            </a:lvl2pPr>
+            <a:lvl3pPr marL="914400" indent="0">
+              <a:buNone/>
+              <a:defRPr sz="1800" b="1"/>
+            </a:lvl3pPr>
+            <a:lvl4pPr marL="1371600" indent="0">
+              <a:buNone/>
+              <a:defRPr sz="1600" b="1"/>
+            </a:lvl4pPr>
+            <a:lvl5pPr marL="1828800" indent="0">
+              <a:buNone/>
+              <a:defRPr sz="1600" b="1"/>
+            </a:lvl5pPr>
+            <a:lvl6pPr marL="2286000" indent="0">
+              <a:buNone/>
+              <a:defRPr sz="1600" b="1"/>
+            </a:lvl6pPr>
+            <a:lvl7pPr marL="2743200" indent="0">
+              <a:buNone/>
+              <a:defRPr sz="1600" b="1"/>
+            </a:lvl7pPr>
+            <a:lvl8pPr marL="3200400" indent="0">
+              <a:buNone/>
+              <a:defRPr sz="1600" b="1"/>
+            </a:lvl8pPr>
+            <a:lvl9pPr marL="3657600" indent="0">
+              <a:buNone/>
+              <a:defRPr sz="1600" b="1"/>
+            </a:lvl9pPr>
+          </a:lstStyle>
+          <a:p>
+            <a:pPr lvl="0"/>
+            <a:r>
+              <a:rPr lang="en-US"/>
+              <a:t>Click to edit Master text styles</a:t>
+            </a:r>
+          </a:p>
+        </p:txBody>
+      </p:sp>
+      <p:sp>
+        <p:nvSpPr>
+          <p:cNvPr id="4" name="Content Placeholder 3">
+            <a:extLst>
+              <a:ext uri="{FF2B5EF4-FFF2-40B4-BE49-F238E27FC236}">
+                <a16:creationId xmlns:a16="http://schemas.microsoft.com/office/drawing/2014/main" id="{6A02B169-FFAA-5847-BCF7-E087280E16A7}"/>
+              </a:ext>
+            </a:extLst>
+          </p:cNvPr>
+          <p:cNvSpPr>
+            <a:spLocks noGrp="1"/>
+          </p:cNvSpPr>
+          <p:nvPr>
+            <p:ph sz="half" idx="2"/>
+          </p:nvPr>
+        </p:nvSpPr>
+        <p:spPr>
+          <a:xfrm>
+            <a:off x="839788" y="2505075"/>
+            <a:ext cx="5157787" cy="3684588"/>
+          </a:xfrm>
+        </p:spPr>
+        <p:txBody>
+          <a:bodyPr/>
+          <a:lstStyle/>
+          <a:p>
+            <a:pPr lvl="0"/>
+            <a:r>
+              <a:rPr lang="en-US"/>
+              <a:t>Click to edit Master text styles</a:t>
+            </a:r>
+          </a:p>
+          <a:p>
+            <a:pPr lvl="1"/>
+            <a:r>
+              <a:rPr lang="en-US"/>
+              <a:t>Second level</a:t>
+            </a:r>
+          </a:p>
+          <a:p>
+            <a:pPr lvl="2"/>
+            <a:r>
+              <a:rPr lang="en-US"/>
+              <a:t>Third level</a:t>
+            </a:r>
+          </a:p>
+          <a:p>
+            <a:pPr lvl="3"/>
+            <a:r>
+              <a:rPr lang="en-US"/>
+              <a:t>Fourth level</a:t>
+            </a:r>
+          </a:p>
+          <a:p>
+            <a:pPr lvl="4"/>
+            <a:r>
+              <a:rPr lang="en-US"/>
+              <a:t>Fifth level</a:t>
+            </a:r>
+          </a:p>
+        </p:txBody>
+      </p:sp>
+      <p:sp>
+        <p:nvSpPr>
+          <p:cNvPr id="5" name="Text Placeholder 4">
+            <a:extLst>
+              <a:ext uri="{FF2B5EF4-FFF2-40B4-BE49-F238E27FC236}">
+                <a16:creationId xmlns:a16="http://schemas.microsoft.com/office/drawing/2014/main" id="{C9C07F25-35C4-DF4D-AD10-FD1D5109CE74}"/>
+              </a:ext>
+            </a:extLst>
+          </p:cNvPr>
+          <p:cNvSpPr>
+            <a:spLocks noGrp="1"/>
+          </p:cNvSpPr>
+          <p:nvPr>
+            <p:ph type="body" sz="quarter" idx="3"/>
+          </p:nvPr>
+        </p:nvSpPr>
+        <p:spPr>
+          <a:xfrm>
+            <a:off x="6172200" y="1681163"/>
+            <a:ext cx="5183188" cy="823912"/>
+          </a:xfrm>
+        </p:spPr>
+        <p:txBody>
+          <a:bodyPr anchor="b"/>
+          <a:lstStyle>
+            <a:lvl1pPr marL="0" indent="0">
+              <a:buNone/>
+              <a:defRPr sz="2400" b="1"/>
+            </a:lvl1pPr>
+            <a:lvl2pPr marL="457200" indent="0">
+              <a:buNone/>
+              <a:defRPr sz="2000" b="1"/>
+            </a:lvl2pPr>
+            <a:lvl3pPr marL="914400" indent="0">
+              <a:buNone/>
+              <a:defRPr sz="1800" b="1"/>
+            </a:lvl3pPr>
+            <a:lvl4pPr marL="1371600" indent="0">
+              <a:buNone/>
+              <a:defRPr sz="1600" b="1"/>
+            </a:lvl4pPr>
+            <a:lvl5pPr marL="1828800" indent="0">
+              <a:buNone/>
+              <a:defRPr sz="1600" b="1"/>
+            </a:lvl5pPr>
+            <a:lvl6pPr marL="2286000" indent="0">
+              <a:buNone/>
+              <a:defRPr sz="1600" b="1"/>
+            </a:lvl6pPr>
+            <a:lvl7pPr marL="2743200" indent="0">
+              <a:buNone/>
+              <a:defRPr sz="1600" b="1"/>
+            </a:lvl7pPr>
+            <a:lvl8pPr marL="3200400" indent="0">
+              <a:buNone/>
+              <a:defRPr sz="1600" b="1"/>
+            </a:lvl8pPr>
+            <a:lvl9pPr marL="3657600" indent="0">
+              <a:buNone/>
+              <a:defRPr sz="1600" b="1"/>
+            </a:lvl9pPr>
+          </a:lstStyle>
+          <a:p>
+            <a:pPr lvl="0"/>
+            <a:r>
+              <a:rPr lang="en-US"/>
+              <a:t>Click to edit Master text styles</a:t>
+            </a:r>
+          </a:p>
+        </p:txBody>
+      </p:sp>
+      <p:sp>
+        <p:nvSpPr>
+          <p:cNvPr id="6" name="Content Placeholder 5">
+            <a:extLst>
+              <a:ext uri="{FF2B5EF4-FFF2-40B4-BE49-F238E27FC236}">
+                <a16:creationId xmlns:a16="http://schemas.microsoft.com/office/drawing/2014/main" id="{0A29764E-0E54-5A4E-B45E-D3DD94CD0D1E}"/>
+              </a:ext>
+            </a:extLst>
+          </p:cNvPr>
+          <p:cNvSpPr>
+            <a:spLocks noGrp="1"/>
+          </p:cNvSpPr>
+          <p:nvPr>
+            <p:ph sz="quarter" idx="4"/>
+          </p:nvPr>
+        </p:nvSpPr>
+        <p:spPr>
+          <a:xfrm>
+            <a:off x="6172200" y="2505075"/>
+            <a:ext cx="5183188" cy="3684588"/>
+          </a:xfrm>
+        </p:spPr>
+        <p:txBody>
+          <a:bodyPr/>
+          <a:lstStyle/>
+          <a:p>
+            <a:pPr lvl="0"/>
+            <a:r>
+              <a:rPr lang="en-US"/>
+              <a:t>Click to edit Master text styles</a:t>
+            </a:r>
+          </a:p>
+          <a:p>
+            <a:pPr lvl="1"/>
+            <a:r>
+              <a:rPr lang="en-US"/>
+              <a:t>Second level</a:t>
+            </a:r>
+          </a:p>
+          <a:p>
+            <a:pPr lvl="2"/>
+            <a:r>
+              <a:rPr lang="en-US"/>
+              <a:t>Third level</a:t>
+            </a:r>
+          </a:p>
+          <a:p>
+            <a:pPr lvl="3"/>
+            <a:r>
+              <a:rPr lang="en-US"/>
+              <a:t>Fourth level</a:t>
+            </a:r>
+          </a:p>
+          <a:p>
+            <a:pPr lvl="4"/>
+            <a:r>
+              <a:rPr lang="en-US"/>
+              <a:t>Fifth level</a:t>
+            </a:r>
+          </a:p>
+        </p:txBody>
+      </p:sp>
+      <p:sp>
+        <p:nvSpPr>
+          <p:cNvPr id="7" name="Date Placeholder 6">
+            <a:extLst>
+              <a:ext uri="{FF2B5EF4-FFF2-40B4-BE49-F238E27FC236}">
+                <a16:creationId xmlns:a16="http://schemas.microsoft.com/office/drawing/2014/main" id="{5AA7E0D3-FC7F-5848-88B9-D01DBAF97448}"/>
+              </a:ext>
+            </a:extLst>
+          </p:cNvPr>
+          <p:cNvSpPr>
+            <a:spLocks noGrp="1"/>
+          </p:cNvSpPr>
+          <p:nvPr>
+            <p:ph type="dt" sz="half" idx="10"/>
+          </p:nvPr>
+        </p:nvSpPr>
+        <p:spPr/>
+        <p:txBody>
+          <a:bodyPr/>
+          <a:lstStyle/>
+          <a:p>
+            <a:fld id="{CDF30110-5C13-E247-99EA-786A70736B50}" type="datetimeFigureOut">
+              <a:rPr lang="en-US" smtClean="0"/>
+              <a:t>10/25/2019</a:t>
+            </a:fld>
+            <a:endParaRPr lang="en-US"/>
+          </a:p>
+        </p:txBody>
+      </p:sp>
+      <p:sp>
+        <p:nvSpPr>
+          <p:cNvPr id="8" name="Footer Placeholder 7">
+            <a:extLst>
+              <a:ext uri="{FF2B5EF4-FFF2-40B4-BE49-F238E27FC236}">
+                <a16:creationId xmlns:a16="http://schemas.microsoft.com/office/drawing/2014/main" id="{0E4E98B8-C99B-E845-BF0B-7528E642593B}"/>
+              </a:ext>
+            </a:extLst>
+          </p:cNvPr>
+          <p:cNvSpPr>
+            <a:spLocks noGrp="1"/>
+          </p:cNvSpPr>
+          <p:nvPr>
+            <p:ph type="ftr" sz="quarter" idx="11"/>
+          </p:nvPr>
+        </p:nvSpPr>
+        <p:spPr/>
+        <p:txBody>
+          <a:bodyPr/>
+          <a:lstStyle/>
+          <a:p>
+            <a:endParaRPr lang="en-US"/>
+          </a:p>
+        </p:txBody>
+      </p:sp>
+      <p:sp>
+        <p:nvSpPr>
+          <p:cNvPr id="9" name="Slide Number Placeholder 8">
+            <a:extLst>
+              <a:ext uri="{FF2B5EF4-FFF2-40B4-BE49-F238E27FC236}">
+                <a16:creationId xmlns:a16="http://schemas.microsoft.com/office/drawing/2014/main" id="{18003134-316F-6344-BFBC-26B629327A75}"/>
+              </a:ext>
+            </a:extLst>
+          </p:cNvPr>
+          <p:cNvSpPr>
+            <a:spLocks noGrp="1"/>
+          </p:cNvSpPr>
+          <p:nvPr>
+            <p:ph type="sldNum" sz="quarter" idx="12"/>
+          </p:nvPr>
+        </p:nvSpPr>
+        <p:spPr/>
+        <p:txBody>
+          <a:bodyPr/>
+          <a:lstStyle/>
+          <a:p>
+            <a:fld id="{2F9F84BD-624A-0641-BF00-D8F88E0B8B4D}" type="slidenum">
+              <a:rPr lang="en-US" smtClean="0"/>
+              <a:t>‹#›</a:t>
+            </a:fld>
+            <a:endParaRPr lang="en-US"/>
+          </a:p>
+        </p:txBody>
+      </p:sp>
+    </p:spTree>
+    <p:extLst>
+      <p:ext uri="{BB962C8B-B14F-4D97-AF65-F5344CB8AC3E}">
+        <p14:creationId xmlns:p14="http://schemas.microsoft.com/office/powerpoint/2010/main" val="2419925507"/>
+      </p:ext>
+    </p:extLst>
+  </p:cSld>
+  <p:clrMapOvr>
+    <a:masterClrMapping/>
+  </p:clrMapOvr>
+</p:sldLayout>
+</file>
+
+<file path=ppt/slideLayouts/slideLayout39.xml><?xml version="1.0" encoding="utf-8"?>
+<p:sldLayout xmlns:a="http://schemas.openxmlformats.org/drawingml/2006/main" xmlns:r="http://schemas.openxmlformats.org/officeDocument/2006/relationships" xmlns:p="http://schemas.openxmlformats.org/presentationml/2006/main" type="titleOnly" preserve="1">
+  <p:cSld name="Title Only">
+    <p:spTree>
+      <p:nvGrpSpPr>
+        <p:cNvPr id="1" name=""/>
+        <p:cNvGrpSpPr/>
+        <p:nvPr/>
+      </p:nvGrpSpPr>
+      <p:grpSpPr>
+        <a:xfrm>
+          <a:off x="0" y="0"/>
+          <a:ext cx="0" cy="0"/>
+          <a:chOff x="0" y="0"/>
+          <a:chExt cx="0" cy="0"/>
+        </a:xfrm>
+      </p:grpSpPr>
+      <p:sp>
+        <p:nvSpPr>
+          <p:cNvPr id="2" name="Title 1">
+            <a:extLst>
+              <a:ext uri="{FF2B5EF4-FFF2-40B4-BE49-F238E27FC236}">
+                <a16:creationId xmlns:a16="http://schemas.microsoft.com/office/drawing/2014/main" id="{3362AEDC-4205-364A-8D21-DBE4189CFF81}"/>
+              </a:ext>
+            </a:extLst>
+          </p:cNvPr>
+          <p:cNvSpPr>
+            <a:spLocks noGrp="1"/>
+          </p:cNvSpPr>
+          <p:nvPr>
+            <p:ph type="title"/>
+          </p:nvPr>
+        </p:nvSpPr>
+        <p:spPr/>
+        <p:txBody>
+          <a:bodyPr/>
+          <a:lstStyle/>
+          <a:p>
+            <a:r>
+              <a:rPr lang="en-US"/>
+              <a:t>Click to edit Master title style</a:t>
+            </a:r>
+          </a:p>
+        </p:txBody>
+      </p:sp>
+      <p:sp>
+        <p:nvSpPr>
+          <p:cNvPr id="3" name="Date Placeholder 2">
+            <a:extLst>
+              <a:ext uri="{FF2B5EF4-FFF2-40B4-BE49-F238E27FC236}">
+                <a16:creationId xmlns:a16="http://schemas.microsoft.com/office/drawing/2014/main" id="{1D2324CD-5F00-D84B-B0F1-5334E163E0FE}"/>
+              </a:ext>
+            </a:extLst>
+          </p:cNvPr>
+          <p:cNvSpPr>
+            <a:spLocks noGrp="1"/>
+          </p:cNvSpPr>
+          <p:nvPr>
+            <p:ph type="dt" sz="half" idx="10"/>
+          </p:nvPr>
+        </p:nvSpPr>
+        <p:spPr/>
+        <p:txBody>
+          <a:bodyPr/>
+          <a:lstStyle/>
+          <a:p>
+            <a:fld id="{CDF30110-5C13-E247-99EA-786A70736B50}" type="datetimeFigureOut">
+              <a:rPr lang="en-US" smtClean="0"/>
+              <a:t>10/25/2019</a:t>
+            </a:fld>
+            <a:endParaRPr lang="en-US"/>
+          </a:p>
+        </p:txBody>
+      </p:sp>
+      <p:sp>
+        <p:nvSpPr>
+          <p:cNvPr id="4" name="Footer Placeholder 3">
+            <a:extLst>
+              <a:ext uri="{FF2B5EF4-FFF2-40B4-BE49-F238E27FC236}">
+                <a16:creationId xmlns:a16="http://schemas.microsoft.com/office/drawing/2014/main" id="{5ACE8521-69E8-0040-9E78-D2490255097D}"/>
+              </a:ext>
+            </a:extLst>
+          </p:cNvPr>
+          <p:cNvSpPr>
+            <a:spLocks noGrp="1"/>
+          </p:cNvSpPr>
+          <p:nvPr>
+            <p:ph type="ftr" sz="quarter" idx="11"/>
+          </p:nvPr>
+        </p:nvSpPr>
+        <p:spPr/>
+        <p:txBody>
+          <a:bodyPr/>
+          <a:lstStyle/>
+          <a:p>
+            <a:endParaRPr lang="en-US"/>
+          </a:p>
+        </p:txBody>
+      </p:sp>
+      <p:sp>
+        <p:nvSpPr>
+          <p:cNvPr id="5" name="Slide Number Placeholder 4">
+            <a:extLst>
+              <a:ext uri="{FF2B5EF4-FFF2-40B4-BE49-F238E27FC236}">
+                <a16:creationId xmlns:a16="http://schemas.microsoft.com/office/drawing/2014/main" id="{E1051ED4-DF92-6C4F-A576-57025197CE35}"/>
+              </a:ext>
+            </a:extLst>
+          </p:cNvPr>
+          <p:cNvSpPr>
+            <a:spLocks noGrp="1"/>
+          </p:cNvSpPr>
+          <p:nvPr>
+            <p:ph type="sldNum" sz="quarter" idx="12"/>
+          </p:nvPr>
+        </p:nvSpPr>
+        <p:spPr/>
+        <p:txBody>
+          <a:bodyPr/>
+          <a:lstStyle/>
+          <a:p>
+            <a:fld id="{2F9F84BD-624A-0641-BF00-D8F88E0B8B4D}" type="slidenum">
+              <a:rPr lang="en-US" smtClean="0"/>
+              <a:t>‹#›</a:t>
+            </a:fld>
+            <a:endParaRPr lang="en-US"/>
+          </a:p>
+        </p:txBody>
+      </p:sp>
+    </p:spTree>
+    <p:extLst>
+      <p:ext uri="{BB962C8B-B14F-4D97-AF65-F5344CB8AC3E}">
+        <p14:creationId xmlns:p14="http://schemas.microsoft.com/office/powerpoint/2010/main" val="2210544801"/>
       </p:ext>
     </p:extLst>
   </p:cSld>
@@ -14373,7 +15914,7 @@
           <a:p>
             <a:fld id="{764EE31D-6788-4F0C-A9F7-BBD29BA514D1}" type="datetime1">
               <a:rPr lang="en-US" smtClean="0"/>
-              <a:t>10/21/2019</a:t>
+              <a:t>10/25/2019</a:t>
             </a:fld>
             <a:endParaRPr lang="en-US"/>
           </a:p>
@@ -14425,6 +15966,1124 @@
     <p:extLst>
       <p:ext uri="{BB962C8B-B14F-4D97-AF65-F5344CB8AC3E}">
         <p14:creationId xmlns:p14="http://schemas.microsoft.com/office/powerpoint/2010/main" val="3379946304"/>
+      </p:ext>
+    </p:extLst>
+  </p:cSld>
+  <p:clrMapOvr>
+    <a:masterClrMapping/>
+  </p:clrMapOvr>
+</p:sldLayout>
+</file>
+
+<file path=ppt/slideLayouts/slideLayout40.xml><?xml version="1.0" encoding="utf-8"?>
+<p:sldLayout xmlns:a="http://schemas.openxmlformats.org/drawingml/2006/main" xmlns:r="http://schemas.openxmlformats.org/officeDocument/2006/relationships" xmlns:p="http://schemas.openxmlformats.org/presentationml/2006/main" type="blank" preserve="1">
+  <p:cSld name="Blank">
+    <p:spTree>
+      <p:nvGrpSpPr>
+        <p:cNvPr id="1" name=""/>
+        <p:cNvGrpSpPr/>
+        <p:nvPr/>
+      </p:nvGrpSpPr>
+      <p:grpSpPr>
+        <a:xfrm>
+          <a:off x="0" y="0"/>
+          <a:ext cx="0" cy="0"/>
+          <a:chOff x="0" y="0"/>
+          <a:chExt cx="0" cy="0"/>
+        </a:xfrm>
+      </p:grpSpPr>
+      <p:sp>
+        <p:nvSpPr>
+          <p:cNvPr id="2" name="Date Placeholder 1">
+            <a:extLst>
+              <a:ext uri="{FF2B5EF4-FFF2-40B4-BE49-F238E27FC236}">
+                <a16:creationId xmlns:a16="http://schemas.microsoft.com/office/drawing/2014/main" id="{3C049210-3734-434D-A732-3B65DC900852}"/>
+              </a:ext>
+            </a:extLst>
+          </p:cNvPr>
+          <p:cNvSpPr>
+            <a:spLocks noGrp="1"/>
+          </p:cNvSpPr>
+          <p:nvPr>
+            <p:ph type="dt" sz="half" idx="10"/>
+          </p:nvPr>
+        </p:nvSpPr>
+        <p:spPr/>
+        <p:txBody>
+          <a:bodyPr/>
+          <a:lstStyle/>
+          <a:p>
+            <a:fld id="{CDF30110-5C13-E247-99EA-786A70736B50}" type="datetimeFigureOut">
+              <a:rPr lang="en-US" smtClean="0"/>
+              <a:t>10/25/2019</a:t>
+            </a:fld>
+            <a:endParaRPr lang="en-US"/>
+          </a:p>
+        </p:txBody>
+      </p:sp>
+      <p:sp>
+        <p:nvSpPr>
+          <p:cNvPr id="3" name="Footer Placeholder 2">
+            <a:extLst>
+              <a:ext uri="{FF2B5EF4-FFF2-40B4-BE49-F238E27FC236}">
+                <a16:creationId xmlns:a16="http://schemas.microsoft.com/office/drawing/2014/main" id="{30198E3A-4626-714F-BA29-BF65AB3591F4}"/>
+              </a:ext>
+            </a:extLst>
+          </p:cNvPr>
+          <p:cNvSpPr>
+            <a:spLocks noGrp="1"/>
+          </p:cNvSpPr>
+          <p:nvPr>
+            <p:ph type="ftr" sz="quarter" idx="11"/>
+          </p:nvPr>
+        </p:nvSpPr>
+        <p:spPr/>
+        <p:txBody>
+          <a:bodyPr/>
+          <a:lstStyle/>
+          <a:p>
+            <a:endParaRPr lang="en-US"/>
+          </a:p>
+        </p:txBody>
+      </p:sp>
+      <p:sp>
+        <p:nvSpPr>
+          <p:cNvPr id="4" name="Slide Number Placeholder 3">
+            <a:extLst>
+              <a:ext uri="{FF2B5EF4-FFF2-40B4-BE49-F238E27FC236}">
+                <a16:creationId xmlns:a16="http://schemas.microsoft.com/office/drawing/2014/main" id="{276C3582-E373-E348-8505-10EE8BF30473}"/>
+              </a:ext>
+            </a:extLst>
+          </p:cNvPr>
+          <p:cNvSpPr>
+            <a:spLocks noGrp="1"/>
+          </p:cNvSpPr>
+          <p:nvPr>
+            <p:ph type="sldNum" sz="quarter" idx="12"/>
+          </p:nvPr>
+        </p:nvSpPr>
+        <p:spPr/>
+        <p:txBody>
+          <a:bodyPr/>
+          <a:lstStyle/>
+          <a:p>
+            <a:fld id="{2F9F84BD-624A-0641-BF00-D8F88E0B8B4D}" type="slidenum">
+              <a:rPr lang="en-US" smtClean="0"/>
+              <a:t>‹#›</a:t>
+            </a:fld>
+            <a:endParaRPr lang="en-US"/>
+          </a:p>
+        </p:txBody>
+      </p:sp>
+    </p:spTree>
+    <p:extLst>
+      <p:ext uri="{BB962C8B-B14F-4D97-AF65-F5344CB8AC3E}">
+        <p14:creationId xmlns:p14="http://schemas.microsoft.com/office/powerpoint/2010/main" val="2916544270"/>
+      </p:ext>
+    </p:extLst>
+  </p:cSld>
+  <p:clrMapOvr>
+    <a:masterClrMapping/>
+  </p:clrMapOvr>
+</p:sldLayout>
+</file>
+
+<file path=ppt/slideLayouts/slideLayout41.xml><?xml version="1.0" encoding="utf-8"?>
+<p:sldLayout xmlns:a="http://schemas.openxmlformats.org/drawingml/2006/main" xmlns:r="http://schemas.openxmlformats.org/officeDocument/2006/relationships" xmlns:p="http://schemas.openxmlformats.org/presentationml/2006/main" type="objTx" preserve="1">
+  <p:cSld name="Content with Caption">
+    <p:spTree>
+      <p:nvGrpSpPr>
+        <p:cNvPr id="1" name=""/>
+        <p:cNvGrpSpPr/>
+        <p:nvPr/>
+      </p:nvGrpSpPr>
+      <p:grpSpPr>
+        <a:xfrm>
+          <a:off x="0" y="0"/>
+          <a:ext cx="0" cy="0"/>
+          <a:chOff x="0" y="0"/>
+          <a:chExt cx="0" cy="0"/>
+        </a:xfrm>
+      </p:grpSpPr>
+      <p:sp>
+        <p:nvSpPr>
+          <p:cNvPr id="2" name="Title 1">
+            <a:extLst>
+              <a:ext uri="{FF2B5EF4-FFF2-40B4-BE49-F238E27FC236}">
+                <a16:creationId xmlns:a16="http://schemas.microsoft.com/office/drawing/2014/main" id="{677486D2-19A1-DA4E-8BB0-BFD5E7B1EDAD}"/>
+              </a:ext>
+            </a:extLst>
+          </p:cNvPr>
+          <p:cNvSpPr>
+            <a:spLocks noGrp="1"/>
+          </p:cNvSpPr>
+          <p:nvPr>
+            <p:ph type="title"/>
+          </p:nvPr>
+        </p:nvSpPr>
+        <p:spPr>
+          <a:xfrm>
+            <a:off x="839788" y="457200"/>
+            <a:ext cx="3932237" cy="1600200"/>
+          </a:xfrm>
+        </p:spPr>
+        <p:txBody>
+          <a:bodyPr anchor="b"/>
+          <a:lstStyle>
+            <a:lvl1pPr>
+              <a:defRPr sz="3200"/>
+            </a:lvl1pPr>
+          </a:lstStyle>
+          <a:p>
+            <a:r>
+              <a:rPr lang="en-US"/>
+              <a:t>Click to edit Master title style</a:t>
+            </a:r>
+          </a:p>
+        </p:txBody>
+      </p:sp>
+      <p:sp>
+        <p:nvSpPr>
+          <p:cNvPr id="3" name="Content Placeholder 2">
+            <a:extLst>
+              <a:ext uri="{FF2B5EF4-FFF2-40B4-BE49-F238E27FC236}">
+                <a16:creationId xmlns:a16="http://schemas.microsoft.com/office/drawing/2014/main" id="{B8576CFB-1173-634D-9A6E-70EE3E0C76FC}"/>
+              </a:ext>
+            </a:extLst>
+          </p:cNvPr>
+          <p:cNvSpPr>
+            <a:spLocks noGrp="1"/>
+          </p:cNvSpPr>
+          <p:nvPr>
+            <p:ph idx="1"/>
+          </p:nvPr>
+        </p:nvSpPr>
+        <p:spPr>
+          <a:xfrm>
+            <a:off x="5183188" y="987425"/>
+            <a:ext cx="6172200" cy="4873625"/>
+          </a:xfrm>
+        </p:spPr>
+        <p:txBody>
+          <a:bodyPr/>
+          <a:lstStyle>
+            <a:lvl1pPr>
+              <a:defRPr sz="3200"/>
+            </a:lvl1pPr>
+            <a:lvl2pPr>
+              <a:defRPr sz="2800"/>
+            </a:lvl2pPr>
+            <a:lvl3pPr>
+              <a:defRPr sz="2400"/>
+            </a:lvl3pPr>
+            <a:lvl4pPr>
+              <a:defRPr sz="2000"/>
+            </a:lvl4pPr>
+            <a:lvl5pPr>
+              <a:defRPr sz="2000"/>
+            </a:lvl5pPr>
+            <a:lvl6pPr>
+              <a:defRPr sz="2000"/>
+            </a:lvl6pPr>
+            <a:lvl7pPr>
+              <a:defRPr sz="2000"/>
+            </a:lvl7pPr>
+            <a:lvl8pPr>
+              <a:defRPr sz="2000"/>
+            </a:lvl8pPr>
+            <a:lvl9pPr>
+              <a:defRPr sz="2000"/>
+            </a:lvl9pPr>
+          </a:lstStyle>
+          <a:p>
+            <a:pPr lvl="0"/>
+            <a:r>
+              <a:rPr lang="en-US"/>
+              <a:t>Click to edit Master text styles</a:t>
+            </a:r>
+          </a:p>
+          <a:p>
+            <a:pPr lvl="1"/>
+            <a:r>
+              <a:rPr lang="en-US"/>
+              <a:t>Second level</a:t>
+            </a:r>
+          </a:p>
+          <a:p>
+            <a:pPr lvl="2"/>
+            <a:r>
+              <a:rPr lang="en-US"/>
+              <a:t>Third level</a:t>
+            </a:r>
+          </a:p>
+          <a:p>
+            <a:pPr lvl="3"/>
+            <a:r>
+              <a:rPr lang="en-US"/>
+              <a:t>Fourth level</a:t>
+            </a:r>
+          </a:p>
+          <a:p>
+            <a:pPr lvl="4"/>
+            <a:r>
+              <a:rPr lang="en-US"/>
+              <a:t>Fifth level</a:t>
+            </a:r>
+          </a:p>
+        </p:txBody>
+      </p:sp>
+      <p:sp>
+        <p:nvSpPr>
+          <p:cNvPr id="4" name="Text Placeholder 3">
+            <a:extLst>
+              <a:ext uri="{FF2B5EF4-FFF2-40B4-BE49-F238E27FC236}">
+                <a16:creationId xmlns:a16="http://schemas.microsoft.com/office/drawing/2014/main" id="{D40C5955-1C49-1E4B-B071-A9A125FF65A7}"/>
+              </a:ext>
+            </a:extLst>
+          </p:cNvPr>
+          <p:cNvSpPr>
+            <a:spLocks noGrp="1"/>
+          </p:cNvSpPr>
+          <p:nvPr>
+            <p:ph type="body" sz="half" idx="2"/>
+          </p:nvPr>
+        </p:nvSpPr>
+        <p:spPr>
+          <a:xfrm>
+            <a:off x="839788" y="2057400"/>
+            <a:ext cx="3932237" cy="3811588"/>
+          </a:xfrm>
+        </p:spPr>
+        <p:txBody>
+          <a:bodyPr/>
+          <a:lstStyle>
+            <a:lvl1pPr marL="0" indent="0">
+              <a:buNone/>
+              <a:defRPr sz="1600"/>
+            </a:lvl1pPr>
+            <a:lvl2pPr marL="457200" indent="0">
+              <a:buNone/>
+              <a:defRPr sz="1400"/>
+            </a:lvl2pPr>
+            <a:lvl3pPr marL="914400" indent="0">
+              <a:buNone/>
+              <a:defRPr sz="1200"/>
+            </a:lvl3pPr>
+            <a:lvl4pPr marL="1371600" indent="0">
+              <a:buNone/>
+              <a:defRPr sz="1000"/>
+            </a:lvl4pPr>
+            <a:lvl5pPr marL="1828800" indent="0">
+              <a:buNone/>
+              <a:defRPr sz="1000"/>
+            </a:lvl5pPr>
+            <a:lvl6pPr marL="2286000" indent="0">
+              <a:buNone/>
+              <a:defRPr sz="1000"/>
+            </a:lvl6pPr>
+            <a:lvl7pPr marL="2743200" indent="0">
+              <a:buNone/>
+              <a:defRPr sz="1000"/>
+            </a:lvl7pPr>
+            <a:lvl8pPr marL="3200400" indent="0">
+              <a:buNone/>
+              <a:defRPr sz="1000"/>
+            </a:lvl8pPr>
+            <a:lvl9pPr marL="3657600" indent="0">
+              <a:buNone/>
+              <a:defRPr sz="1000"/>
+            </a:lvl9pPr>
+          </a:lstStyle>
+          <a:p>
+            <a:pPr lvl="0"/>
+            <a:r>
+              <a:rPr lang="en-US"/>
+              <a:t>Click to edit Master text styles</a:t>
+            </a:r>
+          </a:p>
+        </p:txBody>
+      </p:sp>
+      <p:sp>
+        <p:nvSpPr>
+          <p:cNvPr id="5" name="Date Placeholder 4">
+            <a:extLst>
+              <a:ext uri="{FF2B5EF4-FFF2-40B4-BE49-F238E27FC236}">
+                <a16:creationId xmlns:a16="http://schemas.microsoft.com/office/drawing/2014/main" id="{ADB2B6B6-FF10-394A-9BC9-50F09FFEB282}"/>
+              </a:ext>
+            </a:extLst>
+          </p:cNvPr>
+          <p:cNvSpPr>
+            <a:spLocks noGrp="1"/>
+          </p:cNvSpPr>
+          <p:nvPr>
+            <p:ph type="dt" sz="half" idx="10"/>
+          </p:nvPr>
+        </p:nvSpPr>
+        <p:spPr/>
+        <p:txBody>
+          <a:bodyPr/>
+          <a:lstStyle/>
+          <a:p>
+            <a:fld id="{CDF30110-5C13-E247-99EA-786A70736B50}" type="datetimeFigureOut">
+              <a:rPr lang="en-US" smtClean="0"/>
+              <a:t>10/25/2019</a:t>
+            </a:fld>
+            <a:endParaRPr lang="en-US"/>
+          </a:p>
+        </p:txBody>
+      </p:sp>
+      <p:sp>
+        <p:nvSpPr>
+          <p:cNvPr id="6" name="Footer Placeholder 5">
+            <a:extLst>
+              <a:ext uri="{FF2B5EF4-FFF2-40B4-BE49-F238E27FC236}">
+                <a16:creationId xmlns:a16="http://schemas.microsoft.com/office/drawing/2014/main" id="{0591549B-EBF3-E141-8312-8719CE3E4A7B}"/>
+              </a:ext>
+            </a:extLst>
+          </p:cNvPr>
+          <p:cNvSpPr>
+            <a:spLocks noGrp="1"/>
+          </p:cNvSpPr>
+          <p:nvPr>
+            <p:ph type="ftr" sz="quarter" idx="11"/>
+          </p:nvPr>
+        </p:nvSpPr>
+        <p:spPr/>
+        <p:txBody>
+          <a:bodyPr/>
+          <a:lstStyle/>
+          <a:p>
+            <a:endParaRPr lang="en-US"/>
+          </a:p>
+        </p:txBody>
+      </p:sp>
+      <p:sp>
+        <p:nvSpPr>
+          <p:cNvPr id="7" name="Slide Number Placeholder 6">
+            <a:extLst>
+              <a:ext uri="{FF2B5EF4-FFF2-40B4-BE49-F238E27FC236}">
+                <a16:creationId xmlns:a16="http://schemas.microsoft.com/office/drawing/2014/main" id="{3A145873-7C54-F447-AC6B-61BB2292DB07}"/>
+              </a:ext>
+            </a:extLst>
+          </p:cNvPr>
+          <p:cNvSpPr>
+            <a:spLocks noGrp="1"/>
+          </p:cNvSpPr>
+          <p:nvPr>
+            <p:ph type="sldNum" sz="quarter" idx="12"/>
+          </p:nvPr>
+        </p:nvSpPr>
+        <p:spPr/>
+        <p:txBody>
+          <a:bodyPr/>
+          <a:lstStyle/>
+          <a:p>
+            <a:fld id="{2F9F84BD-624A-0641-BF00-D8F88E0B8B4D}" type="slidenum">
+              <a:rPr lang="en-US" smtClean="0"/>
+              <a:t>‹#›</a:t>
+            </a:fld>
+            <a:endParaRPr lang="en-US"/>
+          </a:p>
+        </p:txBody>
+      </p:sp>
+    </p:spTree>
+    <p:extLst>
+      <p:ext uri="{BB962C8B-B14F-4D97-AF65-F5344CB8AC3E}">
+        <p14:creationId xmlns:p14="http://schemas.microsoft.com/office/powerpoint/2010/main" val="552737040"/>
+      </p:ext>
+    </p:extLst>
+  </p:cSld>
+  <p:clrMapOvr>
+    <a:masterClrMapping/>
+  </p:clrMapOvr>
+</p:sldLayout>
+</file>
+
+<file path=ppt/slideLayouts/slideLayout42.xml><?xml version="1.0" encoding="utf-8"?>
+<p:sldLayout xmlns:a="http://schemas.openxmlformats.org/drawingml/2006/main" xmlns:r="http://schemas.openxmlformats.org/officeDocument/2006/relationships" xmlns:p="http://schemas.openxmlformats.org/presentationml/2006/main" type="picTx" preserve="1">
+  <p:cSld name="Picture with Caption">
+    <p:spTree>
+      <p:nvGrpSpPr>
+        <p:cNvPr id="1" name=""/>
+        <p:cNvGrpSpPr/>
+        <p:nvPr/>
+      </p:nvGrpSpPr>
+      <p:grpSpPr>
+        <a:xfrm>
+          <a:off x="0" y="0"/>
+          <a:ext cx="0" cy="0"/>
+          <a:chOff x="0" y="0"/>
+          <a:chExt cx="0" cy="0"/>
+        </a:xfrm>
+      </p:grpSpPr>
+      <p:sp>
+        <p:nvSpPr>
+          <p:cNvPr id="2" name="Title 1">
+            <a:extLst>
+              <a:ext uri="{FF2B5EF4-FFF2-40B4-BE49-F238E27FC236}">
+                <a16:creationId xmlns:a16="http://schemas.microsoft.com/office/drawing/2014/main" id="{F6040830-36BE-7245-9E54-7B3F6EFEB015}"/>
+              </a:ext>
+            </a:extLst>
+          </p:cNvPr>
+          <p:cNvSpPr>
+            <a:spLocks noGrp="1"/>
+          </p:cNvSpPr>
+          <p:nvPr>
+            <p:ph type="title"/>
+          </p:nvPr>
+        </p:nvSpPr>
+        <p:spPr>
+          <a:xfrm>
+            <a:off x="839788" y="457200"/>
+            <a:ext cx="3932237" cy="1600200"/>
+          </a:xfrm>
+        </p:spPr>
+        <p:txBody>
+          <a:bodyPr anchor="b"/>
+          <a:lstStyle>
+            <a:lvl1pPr>
+              <a:defRPr sz="3200"/>
+            </a:lvl1pPr>
+          </a:lstStyle>
+          <a:p>
+            <a:r>
+              <a:rPr lang="en-US"/>
+              <a:t>Click to edit Master title style</a:t>
+            </a:r>
+          </a:p>
+        </p:txBody>
+      </p:sp>
+      <p:sp>
+        <p:nvSpPr>
+          <p:cNvPr id="3" name="Picture Placeholder 2">
+            <a:extLst>
+              <a:ext uri="{FF2B5EF4-FFF2-40B4-BE49-F238E27FC236}">
+                <a16:creationId xmlns:a16="http://schemas.microsoft.com/office/drawing/2014/main" id="{4A811889-8666-6747-97DB-2FB630EC520C}"/>
+              </a:ext>
+            </a:extLst>
+          </p:cNvPr>
+          <p:cNvSpPr>
+            <a:spLocks noGrp="1"/>
+          </p:cNvSpPr>
+          <p:nvPr>
+            <p:ph type="pic" idx="1"/>
+          </p:nvPr>
+        </p:nvSpPr>
+        <p:spPr>
+          <a:xfrm>
+            <a:off x="5183188" y="987425"/>
+            <a:ext cx="6172200" cy="4873625"/>
+          </a:xfrm>
+        </p:spPr>
+        <p:txBody>
+          <a:bodyPr/>
+          <a:lstStyle>
+            <a:lvl1pPr marL="0" indent="0">
+              <a:buNone/>
+              <a:defRPr sz="3200"/>
+            </a:lvl1pPr>
+            <a:lvl2pPr marL="457200" indent="0">
+              <a:buNone/>
+              <a:defRPr sz="2800"/>
+            </a:lvl2pPr>
+            <a:lvl3pPr marL="914400" indent="0">
+              <a:buNone/>
+              <a:defRPr sz="2400"/>
+            </a:lvl3pPr>
+            <a:lvl4pPr marL="1371600" indent="0">
+              <a:buNone/>
+              <a:defRPr sz="2000"/>
+            </a:lvl4pPr>
+            <a:lvl5pPr marL="1828800" indent="0">
+              <a:buNone/>
+              <a:defRPr sz="2000"/>
+            </a:lvl5pPr>
+            <a:lvl6pPr marL="2286000" indent="0">
+              <a:buNone/>
+              <a:defRPr sz="2000"/>
+            </a:lvl6pPr>
+            <a:lvl7pPr marL="2743200" indent="0">
+              <a:buNone/>
+              <a:defRPr sz="2000"/>
+            </a:lvl7pPr>
+            <a:lvl8pPr marL="3200400" indent="0">
+              <a:buNone/>
+              <a:defRPr sz="2000"/>
+            </a:lvl8pPr>
+            <a:lvl9pPr marL="3657600" indent="0">
+              <a:buNone/>
+              <a:defRPr sz="2000"/>
+            </a:lvl9pPr>
+          </a:lstStyle>
+          <a:p>
+            <a:endParaRPr lang="en-US"/>
+          </a:p>
+        </p:txBody>
+      </p:sp>
+      <p:sp>
+        <p:nvSpPr>
+          <p:cNvPr id="4" name="Text Placeholder 3">
+            <a:extLst>
+              <a:ext uri="{FF2B5EF4-FFF2-40B4-BE49-F238E27FC236}">
+                <a16:creationId xmlns:a16="http://schemas.microsoft.com/office/drawing/2014/main" id="{A09AEABE-6A23-5E4D-BE78-19B6375674D9}"/>
+              </a:ext>
+            </a:extLst>
+          </p:cNvPr>
+          <p:cNvSpPr>
+            <a:spLocks noGrp="1"/>
+          </p:cNvSpPr>
+          <p:nvPr>
+            <p:ph type="body" sz="half" idx="2"/>
+          </p:nvPr>
+        </p:nvSpPr>
+        <p:spPr>
+          <a:xfrm>
+            <a:off x="839788" y="2057400"/>
+            <a:ext cx="3932237" cy="3811588"/>
+          </a:xfrm>
+        </p:spPr>
+        <p:txBody>
+          <a:bodyPr/>
+          <a:lstStyle>
+            <a:lvl1pPr marL="0" indent="0">
+              <a:buNone/>
+              <a:defRPr sz="1600"/>
+            </a:lvl1pPr>
+            <a:lvl2pPr marL="457200" indent="0">
+              <a:buNone/>
+              <a:defRPr sz="1400"/>
+            </a:lvl2pPr>
+            <a:lvl3pPr marL="914400" indent="0">
+              <a:buNone/>
+              <a:defRPr sz="1200"/>
+            </a:lvl3pPr>
+            <a:lvl4pPr marL="1371600" indent="0">
+              <a:buNone/>
+              <a:defRPr sz="1000"/>
+            </a:lvl4pPr>
+            <a:lvl5pPr marL="1828800" indent="0">
+              <a:buNone/>
+              <a:defRPr sz="1000"/>
+            </a:lvl5pPr>
+            <a:lvl6pPr marL="2286000" indent="0">
+              <a:buNone/>
+              <a:defRPr sz="1000"/>
+            </a:lvl6pPr>
+            <a:lvl7pPr marL="2743200" indent="0">
+              <a:buNone/>
+              <a:defRPr sz="1000"/>
+            </a:lvl7pPr>
+            <a:lvl8pPr marL="3200400" indent="0">
+              <a:buNone/>
+              <a:defRPr sz="1000"/>
+            </a:lvl8pPr>
+            <a:lvl9pPr marL="3657600" indent="0">
+              <a:buNone/>
+              <a:defRPr sz="1000"/>
+            </a:lvl9pPr>
+          </a:lstStyle>
+          <a:p>
+            <a:pPr lvl="0"/>
+            <a:r>
+              <a:rPr lang="en-US"/>
+              <a:t>Click to edit Master text styles</a:t>
+            </a:r>
+          </a:p>
+        </p:txBody>
+      </p:sp>
+      <p:sp>
+        <p:nvSpPr>
+          <p:cNvPr id="5" name="Date Placeholder 4">
+            <a:extLst>
+              <a:ext uri="{FF2B5EF4-FFF2-40B4-BE49-F238E27FC236}">
+                <a16:creationId xmlns:a16="http://schemas.microsoft.com/office/drawing/2014/main" id="{A9EE1F38-B33B-FF4C-8EBE-22260B68A0A9}"/>
+              </a:ext>
+            </a:extLst>
+          </p:cNvPr>
+          <p:cNvSpPr>
+            <a:spLocks noGrp="1"/>
+          </p:cNvSpPr>
+          <p:nvPr>
+            <p:ph type="dt" sz="half" idx="10"/>
+          </p:nvPr>
+        </p:nvSpPr>
+        <p:spPr/>
+        <p:txBody>
+          <a:bodyPr/>
+          <a:lstStyle/>
+          <a:p>
+            <a:fld id="{CDF30110-5C13-E247-99EA-786A70736B50}" type="datetimeFigureOut">
+              <a:rPr lang="en-US" smtClean="0"/>
+              <a:t>10/25/2019</a:t>
+            </a:fld>
+            <a:endParaRPr lang="en-US"/>
+          </a:p>
+        </p:txBody>
+      </p:sp>
+      <p:sp>
+        <p:nvSpPr>
+          <p:cNvPr id="6" name="Footer Placeholder 5">
+            <a:extLst>
+              <a:ext uri="{FF2B5EF4-FFF2-40B4-BE49-F238E27FC236}">
+                <a16:creationId xmlns:a16="http://schemas.microsoft.com/office/drawing/2014/main" id="{A2B60DEF-AE9C-E442-A459-AABEA78FB533}"/>
+              </a:ext>
+            </a:extLst>
+          </p:cNvPr>
+          <p:cNvSpPr>
+            <a:spLocks noGrp="1"/>
+          </p:cNvSpPr>
+          <p:nvPr>
+            <p:ph type="ftr" sz="quarter" idx="11"/>
+          </p:nvPr>
+        </p:nvSpPr>
+        <p:spPr/>
+        <p:txBody>
+          <a:bodyPr/>
+          <a:lstStyle/>
+          <a:p>
+            <a:endParaRPr lang="en-US"/>
+          </a:p>
+        </p:txBody>
+      </p:sp>
+      <p:sp>
+        <p:nvSpPr>
+          <p:cNvPr id="7" name="Slide Number Placeholder 6">
+            <a:extLst>
+              <a:ext uri="{FF2B5EF4-FFF2-40B4-BE49-F238E27FC236}">
+                <a16:creationId xmlns:a16="http://schemas.microsoft.com/office/drawing/2014/main" id="{734DBB39-F042-574D-87EF-E3D798E51A4F}"/>
+              </a:ext>
+            </a:extLst>
+          </p:cNvPr>
+          <p:cNvSpPr>
+            <a:spLocks noGrp="1"/>
+          </p:cNvSpPr>
+          <p:nvPr>
+            <p:ph type="sldNum" sz="quarter" idx="12"/>
+          </p:nvPr>
+        </p:nvSpPr>
+        <p:spPr/>
+        <p:txBody>
+          <a:bodyPr/>
+          <a:lstStyle/>
+          <a:p>
+            <a:fld id="{2F9F84BD-624A-0641-BF00-D8F88E0B8B4D}" type="slidenum">
+              <a:rPr lang="en-US" smtClean="0"/>
+              <a:t>‹#›</a:t>
+            </a:fld>
+            <a:endParaRPr lang="en-US"/>
+          </a:p>
+        </p:txBody>
+      </p:sp>
+    </p:spTree>
+    <p:extLst>
+      <p:ext uri="{BB962C8B-B14F-4D97-AF65-F5344CB8AC3E}">
+        <p14:creationId xmlns:p14="http://schemas.microsoft.com/office/powerpoint/2010/main" val="1162682050"/>
+      </p:ext>
+    </p:extLst>
+  </p:cSld>
+  <p:clrMapOvr>
+    <a:masterClrMapping/>
+  </p:clrMapOvr>
+</p:sldLayout>
+</file>
+
+<file path=ppt/slideLayouts/slideLayout43.xml><?xml version="1.0" encoding="utf-8"?>
+<p:sldLayout xmlns:a="http://schemas.openxmlformats.org/drawingml/2006/main" xmlns:r="http://schemas.openxmlformats.org/officeDocument/2006/relationships" xmlns:p="http://schemas.openxmlformats.org/presentationml/2006/main" type="vertTx" preserve="1">
+  <p:cSld name="Title and Vertical Text">
+    <p:spTree>
+      <p:nvGrpSpPr>
+        <p:cNvPr id="1" name=""/>
+        <p:cNvGrpSpPr/>
+        <p:nvPr/>
+      </p:nvGrpSpPr>
+      <p:grpSpPr>
+        <a:xfrm>
+          <a:off x="0" y="0"/>
+          <a:ext cx="0" cy="0"/>
+          <a:chOff x="0" y="0"/>
+          <a:chExt cx="0" cy="0"/>
+        </a:xfrm>
+      </p:grpSpPr>
+      <p:sp>
+        <p:nvSpPr>
+          <p:cNvPr id="2" name="Title 1">
+            <a:extLst>
+              <a:ext uri="{FF2B5EF4-FFF2-40B4-BE49-F238E27FC236}">
+                <a16:creationId xmlns:a16="http://schemas.microsoft.com/office/drawing/2014/main" id="{906E348C-F81A-344B-9326-33AA1D0F754A}"/>
+              </a:ext>
+            </a:extLst>
+          </p:cNvPr>
+          <p:cNvSpPr>
+            <a:spLocks noGrp="1"/>
+          </p:cNvSpPr>
+          <p:nvPr>
+            <p:ph type="title"/>
+          </p:nvPr>
+        </p:nvSpPr>
+        <p:spPr/>
+        <p:txBody>
+          <a:bodyPr/>
+          <a:lstStyle/>
+          <a:p>
+            <a:r>
+              <a:rPr lang="en-US"/>
+              <a:t>Click to edit Master title style</a:t>
+            </a:r>
+          </a:p>
+        </p:txBody>
+      </p:sp>
+      <p:sp>
+        <p:nvSpPr>
+          <p:cNvPr id="3" name="Vertical Text Placeholder 2">
+            <a:extLst>
+              <a:ext uri="{FF2B5EF4-FFF2-40B4-BE49-F238E27FC236}">
+                <a16:creationId xmlns:a16="http://schemas.microsoft.com/office/drawing/2014/main" id="{27971151-3990-5648-9614-BEA9F269843B}"/>
+              </a:ext>
+            </a:extLst>
+          </p:cNvPr>
+          <p:cNvSpPr>
+            <a:spLocks noGrp="1"/>
+          </p:cNvSpPr>
+          <p:nvPr>
+            <p:ph type="body" orient="vert" idx="1"/>
+          </p:nvPr>
+        </p:nvSpPr>
+        <p:spPr/>
+        <p:txBody>
+          <a:bodyPr vert="eaVert"/>
+          <a:lstStyle/>
+          <a:p>
+            <a:pPr lvl="0"/>
+            <a:r>
+              <a:rPr lang="en-US"/>
+              <a:t>Click to edit Master text styles</a:t>
+            </a:r>
+          </a:p>
+          <a:p>
+            <a:pPr lvl="1"/>
+            <a:r>
+              <a:rPr lang="en-US"/>
+              <a:t>Second level</a:t>
+            </a:r>
+          </a:p>
+          <a:p>
+            <a:pPr lvl="2"/>
+            <a:r>
+              <a:rPr lang="en-US"/>
+              <a:t>Third level</a:t>
+            </a:r>
+          </a:p>
+          <a:p>
+            <a:pPr lvl="3"/>
+            <a:r>
+              <a:rPr lang="en-US"/>
+              <a:t>Fourth level</a:t>
+            </a:r>
+          </a:p>
+          <a:p>
+            <a:pPr lvl="4"/>
+            <a:r>
+              <a:rPr lang="en-US"/>
+              <a:t>Fifth level</a:t>
+            </a:r>
+          </a:p>
+        </p:txBody>
+      </p:sp>
+      <p:sp>
+        <p:nvSpPr>
+          <p:cNvPr id="4" name="Date Placeholder 3">
+            <a:extLst>
+              <a:ext uri="{FF2B5EF4-FFF2-40B4-BE49-F238E27FC236}">
+                <a16:creationId xmlns:a16="http://schemas.microsoft.com/office/drawing/2014/main" id="{03C97FE2-B899-664B-A84F-654A6D977F12}"/>
+              </a:ext>
+            </a:extLst>
+          </p:cNvPr>
+          <p:cNvSpPr>
+            <a:spLocks noGrp="1"/>
+          </p:cNvSpPr>
+          <p:nvPr>
+            <p:ph type="dt" sz="half" idx="10"/>
+          </p:nvPr>
+        </p:nvSpPr>
+        <p:spPr/>
+        <p:txBody>
+          <a:bodyPr/>
+          <a:lstStyle/>
+          <a:p>
+            <a:fld id="{CDF30110-5C13-E247-99EA-786A70736B50}" type="datetimeFigureOut">
+              <a:rPr lang="en-US" smtClean="0"/>
+              <a:t>10/25/2019</a:t>
+            </a:fld>
+            <a:endParaRPr lang="en-US"/>
+          </a:p>
+        </p:txBody>
+      </p:sp>
+      <p:sp>
+        <p:nvSpPr>
+          <p:cNvPr id="5" name="Footer Placeholder 4">
+            <a:extLst>
+              <a:ext uri="{FF2B5EF4-FFF2-40B4-BE49-F238E27FC236}">
+                <a16:creationId xmlns:a16="http://schemas.microsoft.com/office/drawing/2014/main" id="{842C6CEF-41A9-6141-8083-8B13A4945001}"/>
+              </a:ext>
+            </a:extLst>
+          </p:cNvPr>
+          <p:cNvSpPr>
+            <a:spLocks noGrp="1"/>
+          </p:cNvSpPr>
+          <p:nvPr>
+            <p:ph type="ftr" sz="quarter" idx="11"/>
+          </p:nvPr>
+        </p:nvSpPr>
+        <p:spPr/>
+        <p:txBody>
+          <a:bodyPr/>
+          <a:lstStyle/>
+          <a:p>
+            <a:endParaRPr lang="en-US"/>
+          </a:p>
+        </p:txBody>
+      </p:sp>
+      <p:sp>
+        <p:nvSpPr>
+          <p:cNvPr id="6" name="Slide Number Placeholder 5">
+            <a:extLst>
+              <a:ext uri="{FF2B5EF4-FFF2-40B4-BE49-F238E27FC236}">
+                <a16:creationId xmlns:a16="http://schemas.microsoft.com/office/drawing/2014/main" id="{86123D8F-4CA6-8C40-B738-E48813F57608}"/>
+              </a:ext>
+            </a:extLst>
+          </p:cNvPr>
+          <p:cNvSpPr>
+            <a:spLocks noGrp="1"/>
+          </p:cNvSpPr>
+          <p:nvPr>
+            <p:ph type="sldNum" sz="quarter" idx="12"/>
+          </p:nvPr>
+        </p:nvSpPr>
+        <p:spPr/>
+        <p:txBody>
+          <a:bodyPr/>
+          <a:lstStyle/>
+          <a:p>
+            <a:fld id="{2F9F84BD-624A-0641-BF00-D8F88E0B8B4D}" type="slidenum">
+              <a:rPr lang="en-US" smtClean="0"/>
+              <a:t>‹#›</a:t>
+            </a:fld>
+            <a:endParaRPr lang="en-US"/>
+          </a:p>
+        </p:txBody>
+      </p:sp>
+    </p:spTree>
+    <p:extLst>
+      <p:ext uri="{BB962C8B-B14F-4D97-AF65-F5344CB8AC3E}">
+        <p14:creationId xmlns:p14="http://schemas.microsoft.com/office/powerpoint/2010/main" val="4076334845"/>
+      </p:ext>
+    </p:extLst>
+  </p:cSld>
+  <p:clrMapOvr>
+    <a:masterClrMapping/>
+  </p:clrMapOvr>
+</p:sldLayout>
+</file>
+
+<file path=ppt/slideLayouts/slideLayout44.xml><?xml version="1.0" encoding="utf-8"?>
+<p:sldLayout xmlns:a="http://schemas.openxmlformats.org/drawingml/2006/main" xmlns:r="http://schemas.openxmlformats.org/officeDocument/2006/relationships" xmlns:p="http://schemas.openxmlformats.org/presentationml/2006/main" type="vertTitleAndTx" preserve="1">
+  <p:cSld name="Vertical Title and Text">
+    <p:spTree>
+      <p:nvGrpSpPr>
+        <p:cNvPr id="1" name=""/>
+        <p:cNvGrpSpPr/>
+        <p:nvPr/>
+      </p:nvGrpSpPr>
+      <p:grpSpPr>
+        <a:xfrm>
+          <a:off x="0" y="0"/>
+          <a:ext cx="0" cy="0"/>
+          <a:chOff x="0" y="0"/>
+          <a:chExt cx="0" cy="0"/>
+        </a:xfrm>
+      </p:grpSpPr>
+      <p:sp>
+        <p:nvSpPr>
+          <p:cNvPr id="2" name="Vertical Title 1">
+            <a:extLst>
+              <a:ext uri="{FF2B5EF4-FFF2-40B4-BE49-F238E27FC236}">
+                <a16:creationId xmlns:a16="http://schemas.microsoft.com/office/drawing/2014/main" id="{BA3AE42C-1CBF-FC44-83D6-0D82B2F5F363}"/>
+              </a:ext>
+            </a:extLst>
+          </p:cNvPr>
+          <p:cNvSpPr>
+            <a:spLocks noGrp="1"/>
+          </p:cNvSpPr>
+          <p:nvPr>
+            <p:ph type="title" orient="vert"/>
+          </p:nvPr>
+        </p:nvSpPr>
+        <p:spPr>
+          <a:xfrm>
+            <a:off x="8724900" y="365125"/>
+            <a:ext cx="2628900" cy="5811838"/>
+          </a:xfrm>
+        </p:spPr>
+        <p:txBody>
+          <a:bodyPr vert="eaVert"/>
+          <a:lstStyle/>
+          <a:p>
+            <a:r>
+              <a:rPr lang="en-US"/>
+              <a:t>Click to edit Master title style</a:t>
+            </a:r>
+          </a:p>
+        </p:txBody>
+      </p:sp>
+      <p:sp>
+        <p:nvSpPr>
+          <p:cNvPr id="3" name="Vertical Text Placeholder 2">
+            <a:extLst>
+              <a:ext uri="{FF2B5EF4-FFF2-40B4-BE49-F238E27FC236}">
+                <a16:creationId xmlns:a16="http://schemas.microsoft.com/office/drawing/2014/main" id="{18784C01-5AAF-C34C-8084-76713ECF02C2}"/>
+              </a:ext>
+            </a:extLst>
+          </p:cNvPr>
+          <p:cNvSpPr>
+            <a:spLocks noGrp="1"/>
+          </p:cNvSpPr>
+          <p:nvPr>
+            <p:ph type="body" orient="vert" idx="1"/>
+          </p:nvPr>
+        </p:nvSpPr>
+        <p:spPr>
+          <a:xfrm>
+            <a:off x="838200" y="365125"/>
+            <a:ext cx="7734300" cy="5811838"/>
+          </a:xfrm>
+        </p:spPr>
+        <p:txBody>
+          <a:bodyPr vert="eaVert"/>
+          <a:lstStyle/>
+          <a:p>
+            <a:pPr lvl="0"/>
+            <a:r>
+              <a:rPr lang="en-US"/>
+              <a:t>Click to edit Master text styles</a:t>
+            </a:r>
+          </a:p>
+          <a:p>
+            <a:pPr lvl="1"/>
+            <a:r>
+              <a:rPr lang="en-US"/>
+              <a:t>Second level</a:t>
+            </a:r>
+          </a:p>
+          <a:p>
+            <a:pPr lvl="2"/>
+            <a:r>
+              <a:rPr lang="en-US"/>
+              <a:t>Third level</a:t>
+            </a:r>
+          </a:p>
+          <a:p>
+            <a:pPr lvl="3"/>
+            <a:r>
+              <a:rPr lang="en-US"/>
+              <a:t>Fourth level</a:t>
+            </a:r>
+          </a:p>
+          <a:p>
+            <a:pPr lvl="4"/>
+            <a:r>
+              <a:rPr lang="en-US"/>
+              <a:t>Fifth level</a:t>
+            </a:r>
+          </a:p>
+        </p:txBody>
+      </p:sp>
+      <p:sp>
+        <p:nvSpPr>
+          <p:cNvPr id="4" name="Date Placeholder 3">
+            <a:extLst>
+              <a:ext uri="{FF2B5EF4-FFF2-40B4-BE49-F238E27FC236}">
+                <a16:creationId xmlns:a16="http://schemas.microsoft.com/office/drawing/2014/main" id="{EA12280F-5FC2-7B44-BF9C-69A0DBFD9ED6}"/>
+              </a:ext>
+            </a:extLst>
+          </p:cNvPr>
+          <p:cNvSpPr>
+            <a:spLocks noGrp="1"/>
+          </p:cNvSpPr>
+          <p:nvPr>
+            <p:ph type="dt" sz="half" idx="10"/>
+          </p:nvPr>
+        </p:nvSpPr>
+        <p:spPr/>
+        <p:txBody>
+          <a:bodyPr/>
+          <a:lstStyle/>
+          <a:p>
+            <a:fld id="{CDF30110-5C13-E247-99EA-786A70736B50}" type="datetimeFigureOut">
+              <a:rPr lang="en-US" smtClean="0"/>
+              <a:t>10/25/2019</a:t>
+            </a:fld>
+            <a:endParaRPr lang="en-US"/>
+          </a:p>
+        </p:txBody>
+      </p:sp>
+      <p:sp>
+        <p:nvSpPr>
+          <p:cNvPr id="5" name="Footer Placeholder 4">
+            <a:extLst>
+              <a:ext uri="{FF2B5EF4-FFF2-40B4-BE49-F238E27FC236}">
+                <a16:creationId xmlns:a16="http://schemas.microsoft.com/office/drawing/2014/main" id="{E66C0241-8031-E544-9784-8182D32735FE}"/>
+              </a:ext>
+            </a:extLst>
+          </p:cNvPr>
+          <p:cNvSpPr>
+            <a:spLocks noGrp="1"/>
+          </p:cNvSpPr>
+          <p:nvPr>
+            <p:ph type="ftr" sz="quarter" idx="11"/>
+          </p:nvPr>
+        </p:nvSpPr>
+        <p:spPr/>
+        <p:txBody>
+          <a:bodyPr/>
+          <a:lstStyle/>
+          <a:p>
+            <a:endParaRPr lang="en-US"/>
+          </a:p>
+        </p:txBody>
+      </p:sp>
+      <p:sp>
+        <p:nvSpPr>
+          <p:cNvPr id="6" name="Slide Number Placeholder 5">
+            <a:extLst>
+              <a:ext uri="{FF2B5EF4-FFF2-40B4-BE49-F238E27FC236}">
+                <a16:creationId xmlns:a16="http://schemas.microsoft.com/office/drawing/2014/main" id="{E6CF62FD-59AD-6148-83A9-9D6117029BAE}"/>
+              </a:ext>
+            </a:extLst>
+          </p:cNvPr>
+          <p:cNvSpPr>
+            <a:spLocks noGrp="1"/>
+          </p:cNvSpPr>
+          <p:nvPr>
+            <p:ph type="sldNum" sz="quarter" idx="12"/>
+          </p:nvPr>
+        </p:nvSpPr>
+        <p:spPr/>
+        <p:txBody>
+          <a:bodyPr/>
+          <a:lstStyle/>
+          <a:p>
+            <a:fld id="{2F9F84BD-624A-0641-BF00-D8F88E0B8B4D}" type="slidenum">
+              <a:rPr lang="en-US" smtClean="0"/>
+              <a:t>‹#›</a:t>
+            </a:fld>
+            <a:endParaRPr lang="en-US"/>
+          </a:p>
+        </p:txBody>
+      </p:sp>
+    </p:spTree>
+    <p:extLst>
+      <p:ext uri="{BB962C8B-B14F-4D97-AF65-F5344CB8AC3E}">
+        <p14:creationId xmlns:p14="http://schemas.microsoft.com/office/powerpoint/2010/main" val="1657521847"/>
       </p:ext>
     </p:extLst>
   </p:cSld>
@@ -14795,7 +17454,7 @@
           <a:p>
             <a:fld id="{A5ECF579-7555-46DE-BFF8-8F57D0DC8502}" type="datetime1">
               <a:rPr lang="en-US" smtClean="0"/>
-              <a:t>10/21/2019</a:t>
+              <a:t>10/25/2019</a:t>
             </a:fld>
             <a:endParaRPr lang="en-US"/>
           </a:p>
@@ -14957,7 +17616,7 @@
           <a:p>
             <a:fld id="{C110FB1E-9106-4545-B03E-DB5825644952}" type="datetime1">
               <a:rPr lang="en-US" smtClean="0"/>
-              <a:t>10/21/2019</a:t>
+              <a:t>10/25/2019</a:t>
             </a:fld>
             <a:endParaRPr lang="en-US"/>
           </a:p>
@@ -15052,7 +17711,7 @@
           <a:p>
             <a:fld id="{F39ABD67-8125-488D-9769-3DE37BCA7DE9}" type="datetime1">
               <a:rPr lang="en-US" smtClean="0"/>
-              <a:t>10/21/2019</a:t>
+              <a:t>10/25/2019</a:t>
             </a:fld>
             <a:endParaRPr lang="en-US"/>
           </a:p>
@@ -15430,7 +18089,7 @@
           <a:p>
             <a:fld id="{C3CF4C65-8ABA-4EF0-9924-69AC7E1F83B4}" type="datetime1">
               <a:rPr lang="en-US" smtClean="0"/>
-              <a:t>10/21/2019</a:t>
+              <a:t>10/25/2019</a:t>
             </a:fld>
             <a:endParaRPr lang="en-US"/>
           </a:p>
@@ -15719,7 +18378,7 @@
           <a:p>
             <a:fld id="{74C47FFE-C4C9-4907-955C-95DD8BBE7549}" type="datetime1">
               <a:rPr lang="en-US" smtClean="0"/>
-              <a:t>10/21/2019</a:t>
+              <a:t>10/25/2019</a:t>
             </a:fld>
             <a:endParaRPr lang="en-US"/>
           </a:p>
@@ -15930,7 +18589,7 @@
           <a:p>
             <a:fld id="{836918E3-1F12-4F74-917D-4660C6CC1B85}" type="datetime1">
               <a:rPr lang="en-US" smtClean="0"/>
-              <a:t>10/21/2019</a:t>
+              <a:t>10/25/2019</a:t>
             </a:fld>
             <a:endParaRPr lang="en-US"/>
           </a:p>
@@ -16683,7 +19342,7 @@
           <a:p>
             <a:fld id="{1740724C-FBF4-4052-9047-6B4616F5023E}" type="datetime1">
               <a:rPr lang="en-US" smtClean="0"/>
-              <a:t>10/21/2019</a:t>
+              <a:t>10/25/2019</a:t>
             </a:fld>
             <a:endParaRPr lang="en-US"/>
           </a:p>
@@ -17252,7 +19911,7 @@
           <a:p>
             <a:fld id="{E8923A75-7625-4A01-87A8-FB826EEAF428}" type="datetime1">
               <a:rPr lang="en-US" smtClean="0"/>
-              <a:t>10/21/2019</a:t>
+              <a:t>10/25/2019</a:t>
             </a:fld>
             <a:endParaRPr lang="en-US"/>
           </a:p>
@@ -17370,6 +20029,574 @@
     <p:sldLayoutId id="2147483749" r:id="rId11"/>
   </p:sldLayoutIdLst>
   <p:hf hdr="0" ftr="0" dt="0"/>
+  <p:txStyles>
+    <p:titleStyle>
+      <a:lvl1pPr algn="l" defTabSz="914400" rtl="0" eaLnBrk="1" latinLnBrk="0" hangingPunct="1">
+        <a:lnSpc>
+          <a:spcPct val="90000"/>
+        </a:lnSpc>
+        <a:spcBef>
+          <a:spcPct val="0"/>
+        </a:spcBef>
+        <a:buNone/>
+        <a:defRPr sz="4400" kern="1200">
+          <a:solidFill>
+            <a:schemeClr val="tx1"/>
+          </a:solidFill>
+          <a:latin typeface="+mj-lt"/>
+          <a:ea typeface="+mj-ea"/>
+          <a:cs typeface="+mj-cs"/>
+        </a:defRPr>
+      </a:lvl1pPr>
+    </p:titleStyle>
+    <p:bodyStyle>
+      <a:lvl1pPr marL="228600" indent="-228600" algn="l" defTabSz="914400" rtl="0" eaLnBrk="1" latinLnBrk="0" hangingPunct="1">
+        <a:lnSpc>
+          <a:spcPct val="90000"/>
+        </a:lnSpc>
+        <a:spcBef>
+          <a:spcPts val="1000"/>
+        </a:spcBef>
+        <a:buFont typeface="Arial" panose="020B0604020202020204" pitchFamily="34" charset="0"/>
+        <a:buChar char="•"/>
+        <a:defRPr sz="2800" kern="1200">
+          <a:solidFill>
+            <a:schemeClr val="tx1"/>
+          </a:solidFill>
+          <a:latin typeface="+mn-lt"/>
+          <a:ea typeface="+mn-ea"/>
+          <a:cs typeface="+mn-cs"/>
+        </a:defRPr>
+      </a:lvl1pPr>
+      <a:lvl2pPr marL="685800" indent="-228600" algn="l" defTabSz="914400" rtl="0" eaLnBrk="1" latinLnBrk="0" hangingPunct="1">
+        <a:lnSpc>
+          <a:spcPct val="90000"/>
+        </a:lnSpc>
+        <a:spcBef>
+          <a:spcPts val="500"/>
+        </a:spcBef>
+        <a:buFont typeface="Arial" panose="020B0604020202020204" pitchFamily="34" charset="0"/>
+        <a:buChar char="•"/>
+        <a:defRPr sz="2400" kern="1200">
+          <a:solidFill>
+            <a:schemeClr val="tx1"/>
+          </a:solidFill>
+          <a:latin typeface="+mn-lt"/>
+          <a:ea typeface="+mn-ea"/>
+          <a:cs typeface="+mn-cs"/>
+        </a:defRPr>
+      </a:lvl2pPr>
+      <a:lvl3pPr marL="1143000" indent="-228600" algn="l" defTabSz="914400" rtl="0" eaLnBrk="1" latinLnBrk="0" hangingPunct="1">
+        <a:lnSpc>
+          <a:spcPct val="90000"/>
+        </a:lnSpc>
+        <a:spcBef>
+          <a:spcPts val="500"/>
+        </a:spcBef>
+        <a:buFont typeface="Arial" panose="020B0604020202020204" pitchFamily="34" charset="0"/>
+        <a:buChar char="•"/>
+        <a:defRPr sz="2000" kern="1200">
+          <a:solidFill>
+            <a:schemeClr val="tx1"/>
+          </a:solidFill>
+          <a:latin typeface="+mn-lt"/>
+          <a:ea typeface="+mn-ea"/>
+          <a:cs typeface="+mn-cs"/>
+        </a:defRPr>
+      </a:lvl3pPr>
+      <a:lvl4pPr marL="1600200" indent="-228600" algn="l" defTabSz="914400" rtl="0" eaLnBrk="1" latinLnBrk="0" hangingPunct="1">
+        <a:lnSpc>
+          <a:spcPct val="90000"/>
+        </a:lnSpc>
+        <a:spcBef>
+          <a:spcPts val="500"/>
+        </a:spcBef>
+        <a:buFont typeface="Arial" panose="020B0604020202020204" pitchFamily="34" charset="0"/>
+        <a:buChar char="•"/>
+        <a:defRPr sz="1800" kern="1200">
+          <a:solidFill>
+            <a:schemeClr val="tx1"/>
+          </a:solidFill>
+          <a:latin typeface="+mn-lt"/>
+          <a:ea typeface="+mn-ea"/>
+          <a:cs typeface="+mn-cs"/>
+        </a:defRPr>
+      </a:lvl4pPr>
+      <a:lvl5pPr marL="2057400" indent="-228600" algn="l" defTabSz="914400" rtl="0" eaLnBrk="1" latinLnBrk="0" hangingPunct="1">
+        <a:lnSpc>
+          <a:spcPct val="90000"/>
+        </a:lnSpc>
+        <a:spcBef>
+          <a:spcPts val="500"/>
+        </a:spcBef>
+        <a:buFont typeface="Arial" panose="020B0604020202020204" pitchFamily="34" charset="0"/>
+        <a:buChar char="•"/>
+        <a:defRPr sz="1800" kern="1200">
+          <a:solidFill>
+            <a:schemeClr val="tx1"/>
+          </a:solidFill>
+          <a:latin typeface="+mn-lt"/>
+          <a:ea typeface="+mn-ea"/>
+          <a:cs typeface="+mn-cs"/>
+        </a:defRPr>
+      </a:lvl5pPr>
+      <a:lvl6pPr marL="2514600" indent="-228600" algn="l" defTabSz="914400" rtl="0" eaLnBrk="1" latinLnBrk="0" hangingPunct="1">
+        <a:lnSpc>
+          <a:spcPct val="90000"/>
+        </a:lnSpc>
+        <a:spcBef>
+          <a:spcPts val="500"/>
+        </a:spcBef>
+        <a:buFont typeface="Arial" panose="020B0604020202020204" pitchFamily="34" charset="0"/>
+        <a:buChar char="•"/>
+        <a:defRPr sz="1800" kern="1200">
+          <a:solidFill>
+            <a:schemeClr val="tx1"/>
+          </a:solidFill>
+          <a:latin typeface="+mn-lt"/>
+          <a:ea typeface="+mn-ea"/>
+          <a:cs typeface="+mn-cs"/>
+        </a:defRPr>
+      </a:lvl6pPr>
+      <a:lvl7pPr marL="2971800" indent="-228600" algn="l" defTabSz="914400" rtl="0" eaLnBrk="1" latinLnBrk="0" hangingPunct="1">
+        <a:lnSpc>
+          <a:spcPct val="90000"/>
+        </a:lnSpc>
+        <a:spcBef>
+          <a:spcPts val="500"/>
+        </a:spcBef>
+        <a:buFont typeface="Arial" panose="020B0604020202020204" pitchFamily="34" charset="0"/>
+        <a:buChar char="•"/>
+        <a:defRPr sz="1800" kern="1200">
+          <a:solidFill>
+            <a:schemeClr val="tx1"/>
+          </a:solidFill>
+          <a:latin typeface="+mn-lt"/>
+          <a:ea typeface="+mn-ea"/>
+          <a:cs typeface="+mn-cs"/>
+        </a:defRPr>
+      </a:lvl7pPr>
+      <a:lvl8pPr marL="3429000" indent="-228600" algn="l" defTabSz="914400" rtl="0" eaLnBrk="1" latinLnBrk="0" hangingPunct="1">
+        <a:lnSpc>
+          <a:spcPct val="90000"/>
+        </a:lnSpc>
+        <a:spcBef>
+          <a:spcPts val="500"/>
+        </a:spcBef>
+        <a:buFont typeface="Arial" panose="020B0604020202020204" pitchFamily="34" charset="0"/>
+        <a:buChar char="•"/>
+        <a:defRPr sz="1800" kern="1200">
+          <a:solidFill>
+            <a:schemeClr val="tx1"/>
+          </a:solidFill>
+          <a:latin typeface="+mn-lt"/>
+          <a:ea typeface="+mn-ea"/>
+          <a:cs typeface="+mn-cs"/>
+        </a:defRPr>
+      </a:lvl8pPr>
+      <a:lvl9pPr marL="3886200" indent="-228600" algn="l" defTabSz="914400" rtl="0" eaLnBrk="1" latinLnBrk="0" hangingPunct="1">
+        <a:lnSpc>
+          <a:spcPct val="90000"/>
+        </a:lnSpc>
+        <a:spcBef>
+          <a:spcPts val="500"/>
+        </a:spcBef>
+        <a:buFont typeface="Arial" panose="020B0604020202020204" pitchFamily="34" charset="0"/>
+        <a:buChar char="•"/>
+        <a:defRPr sz="1800" kern="1200">
+          <a:solidFill>
+            <a:schemeClr val="tx1"/>
+          </a:solidFill>
+          <a:latin typeface="+mn-lt"/>
+          <a:ea typeface="+mn-ea"/>
+          <a:cs typeface="+mn-cs"/>
+        </a:defRPr>
+      </a:lvl9pPr>
+    </p:bodyStyle>
+    <p:otherStyle>
+      <a:defPPr>
+        <a:defRPr lang="en-US"/>
+      </a:defPPr>
+      <a:lvl1pPr marL="0" algn="l" defTabSz="914400" rtl="0" eaLnBrk="1" latinLnBrk="0" hangingPunct="1">
+        <a:defRPr sz="1800" kern="1200">
+          <a:solidFill>
+            <a:schemeClr val="tx1"/>
+          </a:solidFill>
+          <a:latin typeface="+mn-lt"/>
+          <a:ea typeface="+mn-ea"/>
+          <a:cs typeface="+mn-cs"/>
+        </a:defRPr>
+      </a:lvl1pPr>
+      <a:lvl2pPr marL="457200" algn="l" defTabSz="914400" rtl="0" eaLnBrk="1" latinLnBrk="0" hangingPunct="1">
+        <a:defRPr sz="1800" kern="1200">
+          <a:solidFill>
+            <a:schemeClr val="tx1"/>
+          </a:solidFill>
+          <a:latin typeface="+mn-lt"/>
+          <a:ea typeface="+mn-ea"/>
+          <a:cs typeface="+mn-cs"/>
+        </a:defRPr>
+      </a:lvl2pPr>
+      <a:lvl3pPr marL="914400" algn="l" defTabSz="914400" rtl="0" eaLnBrk="1" latinLnBrk="0" hangingPunct="1">
+        <a:defRPr sz="1800" kern="1200">
+          <a:solidFill>
+            <a:schemeClr val="tx1"/>
+          </a:solidFill>
+          <a:latin typeface="+mn-lt"/>
+          <a:ea typeface="+mn-ea"/>
+          <a:cs typeface="+mn-cs"/>
+        </a:defRPr>
+      </a:lvl3pPr>
+      <a:lvl4pPr marL="1371600" algn="l" defTabSz="914400" rtl="0" eaLnBrk="1" latinLnBrk="0" hangingPunct="1">
+        <a:defRPr sz="1800" kern="1200">
+          <a:solidFill>
+            <a:schemeClr val="tx1"/>
+          </a:solidFill>
+          <a:latin typeface="+mn-lt"/>
+          <a:ea typeface="+mn-ea"/>
+          <a:cs typeface="+mn-cs"/>
+        </a:defRPr>
+      </a:lvl4pPr>
+      <a:lvl5pPr marL="1828800" algn="l" defTabSz="914400" rtl="0" eaLnBrk="1" latinLnBrk="0" hangingPunct="1">
+        <a:defRPr sz="1800" kern="1200">
+          <a:solidFill>
+            <a:schemeClr val="tx1"/>
+          </a:solidFill>
+          <a:latin typeface="+mn-lt"/>
+          <a:ea typeface="+mn-ea"/>
+          <a:cs typeface="+mn-cs"/>
+        </a:defRPr>
+      </a:lvl5pPr>
+      <a:lvl6pPr marL="2286000" algn="l" defTabSz="914400" rtl="0" eaLnBrk="1" latinLnBrk="0" hangingPunct="1">
+        <a:defRPr sz="1800" kern="1200">
+          <a:solidFill>
+            <a:schemeClr val="tx1"/>
+          </a:solidFill>
+          <a:latin typeface="+mn-lt"/>
+          <a:ea typeface="+mn-ea"/>
+          <a:cs typeface="+mn-cs"/>
+        </a:defRPr>
+      </a:lvl6pPr>
+      <a:lvl7pPr marL="2743200" algn="l" defTabSz="914400" rtl="0" eaLnBrk="1" latinLnBrk="0" hangingPunct="1">
+        <a:defRPr sz="1800" kern="1200">
+          <a:solidFill>
+            <a:schemeClr val="tx1"/>
+          </a:solidFill>
+          <a:latin typeface="+mn-lt"/>
+          <a:ea typeface="+mn-ea"/>
+          <a:cs typeface="+mn-cs"/>
+        </a:defRPr>
+      </a:lvl7pPr>
+      <a:lvl8pPr marL="3200400" algn="l" defTabSz="914400" rtl="0" eaLnBrk="1" latinLnBrk="0" hangingPunct="1">
+        <a:defRPr sz="1800" kern="1200">
+          <a:solidFill>
+            <a:schemeClr val="tx1"/>
+          </a:solidFill>
+          <a:latin typeface="+mn-lt"/>
+          <a:ea typeface="+mn-ea"/>
+          <a:cs typeface="+mn-cs"/>
+        </a:defRPr>
+      </a:lvl8pPr>
+      <a:lvl9pPr marL="3657600" algn="l" defTabSz="914400" rtl="0" eaLnBrk="1" latinLnBrk="0" hangingPunct="1">
+        <a:defRPr sz="1800" kern="1200">
+          <a:solidFill>
+            <a:schemeClr val="tx1"/>
+          </a:solidFill>
+          <a:latin typeface="+mn-lt"/>
+          <a:ea typeface="+mn-ea"/>
+          <a:cs typeface="+mn-cs"/>
+        </a:defRPr>
+      </a:lvl9pPr>
+    </p:otherStyle>
+  </p:txStyles>
+</p:sldMaster>
+</file>
+
+<file path=ppt/slideMasters/slideMaster4.xml><?xml version="1.0" encoding="utf-8"?>
+<p:sldMaster xmlns:a="http://schemas.openxmlformats.org/drawingml/2006/main" xmlns:r="http://schemas.openxmlformats.org/officeDocument/2006/relationships" xmlns:p="http://schemas.openxmlformats.org/presentationml/2006/main">
+  <p:cSld>
+    <p:bg>
+      <p:bgRef idx="1001">
+        <a:schemeClr val="bg1"/>
+      </p:bgRef>
+    </p:bg>
+    <p:spTree>
+      <p:nvGrpSpPr>
+        <p:cNvPr id="1" name=""/>
+        <p:cNvGrpSpPr/>
+        <p:nvPr/>
+      </p:nvGrpSpPr>
+      <p:grpSpPr>
+        <a:xfrm>
+          <a:off x="0" y="0"/>
+          <a:ext cx="0" cy="0"/>
+          <a:chOff x="0" y="0"/>
+          <a:chExt cx="0" cy="0"/>
+        </a:xfrm>
+      </p:grpSpPr>
+      <p:sp>
+        <p:nvSpPr>
+          <p:cNvPr id="2" name="Title Placeholder 1">
+            <a:extLst>
+              <a:ext uri="{FF2B5EF4-FFF2-40B4-BE49-F238E27FC236}">
+                <a16:creationId xmlns:a16="http://schemas.microsoft.com/office/drawing/2014/main" id="{A7E3A7A3-57F5-8F4F-8712-F42D286E1325}"/>
+              </a:ext>
+            </a:extLst>
+          </p:cNvPr>
+          <p:cNvSpPr>
+            <a:spLocks noGrp="1"/>
+          </p:cNvSpPr>
+          <p:nvPr>
+            <p:ph type="title"/>
+          </p:nvPr>
+        </p:nvSpPr>
+        <p:spPr>
+          <a:xfrm>
+            <a:off x="838200" y="365125"/>
+            <a:ext cx="10515600" cy="1325563"/>
+          </a:xfrm>
+          <a:prstGeom prst="rect">
+            <a:avLst/>
+          </a:prstGeom>
+        </p:spPr>
+        <p:txBody>
+          <a:bodyPr vert="horz" lIns="91440" tIns="45720" rIns="91440" bIns="45720" rtlCol="0" anchor="ctr">
+            <a:normAutofit/>
+          </a:bodyPr>
+          <a:lstStyle/>
+          <a:p>
+            <a:r>
+              <a:rPr lang="en-US"/>
+              <a:t>Click to edit Master title style</a:t>
+            </a:r>
+          </a:p>
+        </p:txBody>
+      </p:sp>
+      <p:sp>
+        <p:nvSpPr>
+          <p:cNvPr id="3" name="Text Placeholder 2">
+            <a:extLst>
+              <a:ext uri="{FF2B5EF4-FFF2-40B4-BE49-F238E27FC236}">
+                <a16:creationId xmlns:a16="http://schemas.microsoft.com/office/drawing/2014/main" id="{7E7C6C8A-101B-8A41-A54C-D122932CD189}"/>
+              </a:ext>
+            </a:extLst>
+          </p:cNvPr>
+          <p:cNvSpPr>
+            <a:spLocks noGrp="1"/>
+          </p:cNvSpPr>
+          <p:nvPr>
+            <p:ph type="body" idx="1"/>
+          </p:nvPr>
+        </p:nvSpPr>
+        <p:spPr>
+          <a:xfrm>
+            <a:off x="838200" y="1825625"/>
+            <a:ext cx="10515600" cy="4351338"/>
+          </a:xfrm>
+          <a:prstGeom prst="rect">
+            <a:avLst/>
+          </a:prstGeom>
+        </p:spPr>
+        <p:txBody>
+          <a:bodyPr vert="horz" lIns="91440" tIns="45720" rIns="91440" bIns="45720" rtlCol="0">
+            <a:normAutofit/>
+          </a:bodyPr>
+          <a:lstStyle/>
+          <a:p>
+            <a:pPr lvl="0"/>
+            <a:r>
+              <a:rPr lang="en-US"/>
+              <a:t>Click to edit Master text styles</a:t>
+            </a:r>
+          </a:p>
+          <a:p>
+            <a:pPr lvl="1"/>
+            <a:r>
+              <a:rPr lang="en-US"/>
+              <a:t>Second level</a:t>
+            </a:r>
+          </a:p>
+          <a:p>
+            <a:pPr lvl="2"/>
+            <a:r>
+              <a:rPr lang="en-US"/>
+              <a:t>Third level</a:t>
+            </a:r>
+          </a:p>
+          <a:p>
+            <a:pPr lvl="3"/>
+            <a:r>
+              <a:rPr lang="en-US"/>
+              <a:t>Fourth level</a:t>
+            </a:r>
+          </a:p>
+          <a:p>
+            <a:pPr lvl="4"/>
+            <a:r>
+              <a:rPr lang="en-US"/>
+              <a:t>Fifth level</a:t>
+            </a:r>
+          </a:p>
+        </p:txBody>
+      </p:sp>
+      <p:sp>
+        <p:nvSpPr>
+          <p:cNvPr id="4" name="Date Placeholder 3">
+            <a:extLst>
+              <a:ext uri="{FF2B5EF4-FFF2-40B4-BE49-F238E27FC236}">
+                <a16:creationId xmlns:a16="http://schemas.microsoft.com/office/drawing/2014/main" id="{1BA830E0-FCB9-7343-97E1-FE0B6D93E4EE}"/>
+              </a:ext>
+            </a:extLst>
+          </p:cNvPr>
+          <p:cNvSpPr>
+            <a:spLocks noGrp="1"/>
+          </p:cNvSpPr>
+          <p:nvPr>
+            <p:ph type="dt" sz="half" idx="2"/>
+          </p:nvPr>
+        </p:nvSpPr>
+        <p:spPr>
+          <a:xfrm>
+            <a:off x="838200" y="6356350"/>
+            <a:ext cx="2743200" cy="365125"/>
+          </a:xfrm>
+          <a:prstGeom prst="rect">
+            <a:avLst/>
+          </a:prstGeom>
+        </p:spPr>
+        <p:txBody>
+          <a:bodyPr vert="horz" lIns="91440" tIns="45720" rIns="91440" bIns="45720" rtlCol="0" anchor="ctr"/>
+          <a:lstStyle>
+            <a:lvl1pPr algn="l">
+              <a:defRPr sz="1200">
+                <a:solidFill>
+                  <a:schemeClr val="tx1">
+                    <a:tint val="75000"/>
+                  </a:schemeClr>
+                </a:solidFill>
+              </a:defRPr>
+            </a:lvl1pPr>
+          </a:lstStyle>
+          <a:p>
+            <a:fld id="{CDF30110-5C13-E247-99EA-786A70736B50}" type="datetimeFigureOut">
+              <a:rPr lang="en-US" smtClean="0"/>
+              <a:t>10/25/2019</a:t>
+            </a:fld>
+            <a:endParaRPr lang="en-US"/>
+          </a:p>
+        </p:txBody>
+      </p:sp>
+      <p:sp>
+        <p:nvSpPr>
+          <p:cNvPr id="5" name="Footer Placeholder 4">
+            <a:extLst>
+              <a:ext uri="{FF2B5EF4-FFF2-40B4-BE49-F238E27FC236}">
+                <a16:creationId xmlns:a16="http://schemas.microsoft.com/office/drawing/2014/main" id="{813005FE-8DBD-5243-97C4-390D7BE62FFC}"/>
+              </a:ext>
+            </a:extLst>
+          </p:cNvPr>
+          <p:cNvSpPr>
+            <a:spLocks noGrp="1"/>
+          </p:cNvSpPr>
+          <p:nvPr>
+            <p:ph type="ftr" sz="quarter" idx="3"/>
+          </p:nvPr>
+        </p:nvSpPr>
+        <p:spPr>
+          <a:xfrm>
+            <a:off x="4038600" y="6356350"/>
+            <a:ext cx="4114800" cy="365125"/>
+          </a:xfrm>
+          <a:prstGeom prst="rect">
+            <a:avLst/>
+          </a:prstGeom>
+        </p:spPr>
+        <p:txBody>
+          <a:bodyPr vert="horz" lIns="91440" tIns="45720" rIns="91440" bIns="45720" rtlCol="0" anchor="ctr"/>
+          <a:lstStyle>
+            <a:lvl1pPr algn="ctr">
+              <a:defRPr sz="1200">
+                <a:solidFill>
+                  <a:schemeClr val="tx1">
+                    <a:tint val="75000"/>
+                  </a:schemeClr>
+                </a:solidFill>
+              </a:defRPr>
+            </a:lvl1pPr>
+          </a:lstStyle>
+          <a:p>
+            <a:endParaRPr lang="en-US"/>
+          </a:p>
+        </p:txBody>
+      </p:sp>
+      <p:sp>
+        <p:nvSpPr>
+          <p:cNvPr id="6" name="Slide Number Placeholder 5">
+            <a:extLst>
+              <a:ext uri="{FF2B5EF4-FFF2-40B4-BE49-F238E27FC236}">
+                <a16:creationId xmlns:a16="http://schemas.microsoft.com/office/drawing/2014/main" id="{28837BDF-EA2E-2442-A130-FC7E47C422BE}"/>
+              </a:ext>
+            </a:extLst>
+          </p:cNvPr>
+          <p:cNvSpPr>
+            <a:spLocks noGrp="1"/>
+          </p:cNvSpPr>
+          <p:nvPr>
+            <p:ph type="sldNum" sz="quarter" idx="4"/>
+          </p:nvPr>
+        </p:nvSpPr>
+        <p:spPr>
+          <a:xfrm>
+            <a:off x="8610600" y="6356350"/>
+            <a:ext cx="2743200" cy="365125"/>
+          </a:xfrm>
+          <a:prstGeom prst="rect">
+            <a:avLst/>
+          </a:prstGeom>
+        </p:spPr>
+        <p:txBody>
+          <a:bodyPr vert="horz" lIns="91440" tIns="45720" rIns="91440" bIns="45720" rtlCol="0" anchor="ctr"/>
+          <a:lstStyle>
+            <a:lvl1pPr algn="r">
+              <a:defRPr sz="1200">
+                <a:solidFill>
+                  <a:schemeClr val="tx1">
+                    <a:tint val="75000"/>
+                  </a:schemeClr>
+                </a:solidFill>
+              </a:defRPr>
+            </a:lvl1pPr>
+          </a:lstStyle>
+          <a:p>
+            <a:fld id="{2F9F84BD-624A-0641-BF00-D8F88E0B8B4D}" type="slidenum">
+              <a:rPr lang="en-US" smtClean="0"/>
+              <a:t>‹#›</a:t>
+            </a:fld>
+            <a:endParaRPr lang="en-US"/>
+          </a:p>
+        </p:txBody>
+      </p:sp>
+    </p:spTree>
+    <p:extLst>
+      <p:ext uri="{BB962C8B-B14F-4D97-AF65-F5344CB8AC3E}">
+        <p14:creationId xmlns:p14="http://schemas.microsoft.com/office/powerpoint/2010/main" val="389924564"/>
+      </p:ext>
+    </p:extLst>
+  </p:cSld>
+  <p:clrMap bg1="lt1" tx1="dk1" bg2="lt2" tx2="dk2" accent1="accent1" accent2="accent2" accent3="accent3" accent4="accent4" accent5="accent5" accent6="accent6" hlink="hlink" folHlink="folHlink"/>
+  <p:sldLayoutIdLst>
+    <p:sldLayoutId id="2147483751" r:id="rId1"/>
+    <p:sldLayoutId id="2147483752" r:id="rId2"/>
+    <p:sldLayoutId id="2147483753" r:id="rId3"/>
+    <p:sldLayoutId id="2147483754" r:id="rId4"/>
+    <p:sldLayoutId id="2147483755" r:id="rId5"/>
+    <p:sldLayoutId id="2147483756" r:id="rId6"/>
+    <p:sldLayoutId id="2147483757" r:id="rId7"/>
+    <p:sldLayoutId id="2147483758" r:id="rId8"/>
+    <p:sldLayoutId id="2147483759" r:id="rId9"/>
+    <p:sldLayoutId id="2147483760" r:id="rId10"/>
+    <p:sldLayoutId id="2147483761" r:id="rId11"/>
+  </p:sldLayoutIdLst>
   <p:txStyles>
     <p:titleStyle>
       <a:lvl1pPr algn="l" defTabSz="914400" rtl="0" eaLnBrk="1" latinLnBrk="0" hangingPunct="1">
@@ -22646,35 +25873,6 @@
           </a:graphicData>
         </a:graphic>
       </p:graphicFrame>
-      <p:sp>
-        <p:nvSpPr>
-          <p:cNvPr id="3" name="Slide Number Placeholder 2">
-            <a:extLst>
-              <a:ext uri="{FF2B5EF4-FFF2-40B4-BE49-F238E27FC236}">
-                <a16:creationId xmlns:a16="http://schemas.microsoft.com/office/drawing/2014/main" id="{E011ACEB-E5BD-4E2D-A0D0-0ECD637B084D}"/>
-              </a:ext>
-            </a:extLst>
-          </p:cNvPr>
-          <p:cNvSpPr>
-            <a:spLocks noGrp="1"/>
-          </p:cNvSpPr>
-          <p:nvPr>
-            <p:ph type="sldNum" sz="quarter" idx="12"/>
-          </p:nvPr>
-        </p:nvSpPr>
-        <p:spPr/>
-        <p:txBody>
-          <a:bodyPr/>
-          <a:lstStyle/>
-          <a:p>
-            <a:fld id="{2F9F84BD-624A-0641-BF00-D8F88E0B8B4D}" type="slidenum">
-              <a:rPr lang="en-US" smtClean="0"/>
-              <a:t>19</a:t>
-            </a:fld>
-            <a:endParaRPr lang="en-US"/>
-          </a:p>
-        </p:txBody>
-      </p:sp>
     </p:spTree>
     <p:extLst>
       <p:ext uri="{BB962C8B-B14F-4D97-AF65-F5344CB8AC3E}">
@@ -27192,44 +30390,44 @@
 </file>
 
 <file path=ppt/theme/theme4.xml><?xml version="1.0" encoding="utf-8"?>
-<a:theme xmlns:a="http://schemas.openxmlformats.org/drawingml/2006/main" name="Office Theme">
+<a:theme xmlns:a="http://schemas.openxmlformats.org/drawingml/2006/main" name="2_Office Theme">
   <a:themeElements>
-    <a:clrScheme name="Office">
+    <a:clrScheme name="R-Ladies">
       <a:dk1>
-        <a:sysClr val="windowText" lastClr="000000"/>
+        <a:srgbClr val="181818"/>
       </a:dk1>
       <a:lt1>
-        <a:sysClr val="window" lastClr="FFFFFF"/>
+        <a:srgbClr val="FFFFFF"/>
       </a:lt1>
       <a:dk2>
-        <a:srgbClr val="44546A"/>
+        <a:srgbClr val="D3D3D3"/>
       </a:dk2>
       <a:lt2>
-        <a:srgbClr val="E7E6E6"/>
+        <a:srgbClr val="EAE5EB"/>
       </a:lt2>
       <a:accent1>
-        <a:srgbClr val="4472C4"/>
+        <a:srgbClr val="562457"/>
       </a:accent1>
       <a:accent2>
-        <a:srgbClr val="ED7D31"/>
+        <a:srgbClr val="88388A"/>
       </a:accent2>
       <a:accent3>
-        <a:srgbClr val="A5A5A5"/>
+        <a:srgbClr val="FFFFFF"/>
       </a:accent3>
       <a:accent4>
-        <a:srgbClr val="FFC000"/>
+        <a:srgbClr val="665EB8"/>
       </a:accent4>
       <a:accent5>
-        <a:srgbClr val="5B9BD5"/>
+        <a:srgbClr val="45A5ED"/>
       </a:accent5>
       <a:accent6>
-        <a:srgbClr val="70AD47"/>
+        <a:srgbClr val="5982DB"/>
       </a:accent6>
       <a:hlink>
-        <a:srgbClr val="0563C1"/>
+        <a:srgbClr val="0066FF"/>
       </a:hlink>
       <a:folHlink>
-        <a:srgbClr val="954F72"/>
+        <a:srgbClr val="666699"/>
       </a:folHlink>
     </a:clrScheme>
     <a:fontScheme name="Office">
@@ -27779,4 +30977,299 @@
     </a:ext>
   </a:extLst>
 </a:theme>
+</file>
+
+<file path=ppt/theme/theme6.xml><?xml version="1.0" encoding="utf-8"?>
+<a:theme xmlns:a="http://schemas.openxmlformats.org/drawingml/2006/main" name="Office Theme">
+  <a:themeElements>
+    <a:clrScheme name="Office">
+      <a:dk1>
+        <a:sysClr val="windowText" lastClr="000000"/>
+      </a:dk1>
+      <a:lt1>
+        <a:sysClr val="window" lastClr="FFFFFF"/>
+      </a:lt1>
+      <a:dk2>
+        <a:srgbClr val="44546A"/>
+      </a:dk2>
+      <a:lt2>
+        <a:srgbClr val="E7E6E6"/>
+      </a:lt2>
+      <a:accent1>
+        <a:srgbClr val="4472C4"/>
+      </a:accent1>
+      <a:accent2>
+        <a:srgbClr val="ED7D31"/>
+      </a:accent2>
+      <a:accent3>
+        <a:srgbClr val="A5A5A5"/>
+      </a:accent3>
+      <a:accent4>
+        <a:srgbClr val="FFC000"/>
+      </a:accent4>
+      <a:accent5>
+        <a:srgbClr val="5B9BD5"/>
+      </a:accent5>
+      <a:accent6>
+        <a:srgbClr val="70AD47"/>
+      </a:accent6>
+      <a:hlink>
+        <a:srgbClr val="0563C1"/>
+      </a:hlink>
+      <a:folHlink>
+        <a:srgbClr val="954F72"/>
+      </a:folHlink>
+    </a:clrScheme>
+    <a:fontScheme name="Office">
+      <a:majorFont>
+        <a:latin typeface="Calibri Light" panose="020F0302020204030204"/>
+        <a:ea typeface=""/>
+        <a:cs typeface=""/>
+        <a:font script="Jpan" typeface="游ゴシック Light"/>
+        <a:font script="Hang" typeface="맑은 고딕"/>
+        <a:font script="Hans" typeface="等线 Light"/>
+        <a:font script="Hant" typeface="新細明體"/>
+        <a:font script="Arab" typeface="Times New Roman"/>
+        <a:font script="Hebr" typeface="Times New Roman"/>
+        <a:font script="Thai" typeface="Angsana New"/>
+        <a:font script="Ethi" typeface="Nyala"/>
+        <a:font script="Beng" typeface="Vrinda"/>
+        <a:font script="Gujr" typeface="Shruti"/>
+        <a:font script="Khmr" typeface="MoolBoran"/>
+        <a:font script="Knda" typeface="Tunga"/>
+        <a:font script="Guru" typeface="Raavi"/>
+        <a:font script="Cans" typeface="Euphemia"/>
+        <a:font script="Cher" typeface="Plantagenet Cherokee"/>
+        <a:font script="Yiii" typeface="Microsoft Yi Baiti"/>
+        <a:font script="Tibt" typeface="Microsoft Himalaya"/>
+        <a:font script="Thaa" typeface="MV Boli"/>
+        <a:font script="Deva" typeface="Mangal"/>
+        <a:font script="Telu" typeface="Gautami"/>
+        <a:font script="Taml" typeface="Latha"/>
+        <a:font script="Syrc" typeface="Estrangelo Edessa"/>
+        <a:font script="Orya" typeface="Kalinga"/>
+        <a:font script="Mlym" typeface="Kartika"/>
+        <a:font script="Laoo" typeface="DokChampa"/>
+        <a:font script="Sinh" typeface="Iskoola Pota"/>
+        <a:font script="Mong" typeface="Mongolian Baiti"/>
+        <a:font script="Viet" typeface="Times New Roman"/>
+        <a:font script="Uigh" typeface="Microsoft Uighur"/>
+        <a:font script="Geor" typeface="Sylfaen"/>
+        <a:font script="Armn" typeface="Arial"/>
+        <a:font script="Bugi" typeface="Leelawadee UI"/>
+        <a:font script="Bopo" typeface="Microsoft JhengHei"/>
+        <a:font script="Java" typeface="Javanese Text"/>
+        <a:font script="Lisu" typeface="Segoe UI"/>
+        <a:font script="Mymr" typeface="Myanmar Text"/>
+        <a:font script="Nkoo" typeface="Ebrima"/>
+        <a:font script="Olck" typeface="Nirmala UI"/>
+        <a:font script="Osma" typeface="Ebrima"/>
+        <a:font script="Phag" typeface="Phagspa"/>
+        <a:font script="Syrn" typeface="Estrangelo Edessa"/>
+        <a:font script="Syrj" typeface="Estrangelo Edessa"/>
+        <a:font script="Syre" typeface="Estrangelo Edessa"/>
+        <a:font script="Sora" typeface="Nirmala UI"/>
+        <a:font script="Tale" typeface="Microsoft Tai Le"/>
+        <a:font script="Talu" typeface="Microsoft New Tai Lue"/>
+        <a:font script="Tfng" typeface="Ebrima"/>
+      </a:majorFont>
+      <a:minorFont>
+        <a:latin typeface="Calibri" panose="020F0502020204030204"/>
+        <a:ea typeface=""/>
+        <a:cs typeface=""/>
+        <a:font script="Jpan" typeface="游ゴシック"/>
+        <a:font script="Hang" typeface="맑은 고딕"/>
+        <a:font script="Hans" typeface="等线"/>
+        <a:font script="Hant" typeface="新細明體"/>
+        <a:font script="Arab" typeface="Arial"/>
+        <a:font script="Hebr" typeface="Arial"/>
+        <a:font script="Thai" typeface="Cordia New"/>
+        <a:font script="Ethi" typeface="Nyala"/>
+        <a:font script="Beng" typeface="Vrinda"/>
+        <a:font script="Gujr" typeface="Shruti"/>
+        <a:font script="Khmr" typeface="DaunPenh"/>
+        <a:font script="Knda" typeface="Tunga"/>
+        <a:font script="Guru" typeface="Raavi"/>
+        <a:font script="Cans" typeface="Euphemia"/>
+        <a:font script="Cher" typeface="Plantagenet Cherokee"/>
+        <a:font script="Yiii" typeface="Microsoft Yi Baiti"/>
+        <a:font script="Tibt" typeface="Microsoft Himalaya"/>
+        <a:font script="Thaa" typeface="MV Boli"/>
+        <a:font script="Deva" typeface="Mangal"/>
+        <a:font script="Telu" typeface="Gautami"/>
+        <a:font script="Taml" typeface="Latha"/>
+        <a:font script="Syrc" typeface="Estrangelo Edessa"/>
+        <a:font script="Orya" typeface="Kalinga"/>
+        <a:font script="Mlym" typeface="Kartika"/>
+        <a:font script="Laoo" typeface="DokChampa"/>
+        <a:font script="Sinh" typeface="Iskoola Pota"/>
+        <a:font script="Mong" typeface="Mongolian Baiti"/>
+        <a:font script="Viet" typeface="Arial"/>
+        <a:font script="Uigh" typeface="Microsoft Uighur"/>
+        <a:font script="Geor" typeface="Sylfaen"/>
+        <a:font script="Armn" typeface="Arial"/>
+        <a:font script="Bugi" typeface="Leelawadee UI"/>
+        <a:font script="Bopo" typeface="Microsoft JhengHei"/>
+        <a:font script="Java" typeface="Javanese Text"/>
+        <a:font script="Lisu" typeface="Segoe UI"/>
+        <a:font script="Mymr" typeface="Myanmar Text"/>
+        <a:font script="Nkoo" typeface="Ebrima"/>
+        <a:font script="Olck" typeface="Nirmala UI"/>
+        <a:font script="Osma" typeface="Ebrima"/>
+        <a:font script="Phag" typeface="Phagspa"/>
+        <a:font script="Syrn" typeface="Estrangelo Edessa"/>
+        <a:font script="Syrj" typeface="Estrangelo Edessa"/>
+        <a:font script="Syre" typeface="Estrangelo Edessa"/>
+        <a:font script="Sora" typeface="Nirmala UI"/>
+        <a:font script="Tale" typeface="Microsoft Tai Le"/>
+        <a:font script="Talu" typeface="Microsoft New Tai Lue"/>
+        <a:font script="Tfng" typeface="Ebrima"/>
+      </a:minorFont>
+    </a:fontScheme>
+    <a:fmtScheme name="Office">
+      <a:fillStyleLst>
+        <a:solidFill>
+          <a:schemeClr val="phClr"/>
+        </a:solidFill>
+        <a:gradFill rotWithShape="1">
+          <a:gsLst>
+            <a:gs pos="0">
+              <a:schemeClr val="phClr">
+                <a:lumMod val="110000"/>
+                <a:satMod val="105000"/>
+                <a:tint val="67000"/>
+              </a:schemeClr>
+            </a:gs>
+            <a:gs pos="50000">
+              <a:schemeClr val="phClr">
+                <a:lumMod val="105000"/>
+                <a:satMod val="103000"/>
+                <a:tint val="73000"/>
+              </a:schemeClr>
+            </a:gs>
+            <a:gs pos="100000">
+              <a:schemeClr val="phClr">
+                <a:lumMod val="105000"/>
+                <a:satMod val="109000"/>
+                <a:tint val="81000"/>
+              </a:schemeClr>
+            </a:gs>
+          </a:gsLst>
+          <a:lin ang="5400000" scaled="0"/>
+        </a:gradFill>
+        <a:gradFill rotWithShape="1">
+          <a:gsLst>
+            <a:gs pos="0">
+              <a:schemeClr val="phClr">
+                <a:satMod val="103000"/>
+                <a:lumMod val="102000"/>
+                <a:tint val="94000"/>
+              </a:schemeClr>
+            </a:gs>
+            <a:gs pos="50000">
+              <a:schemeClr val="phClr">
+                <a:satMod val="110000"/>
+                <a:lumMod val="100000"/>
+                <a:shade val="100000"/>
+              </a:schemeClr>
+            </a:gs>
+            <a:gs pos="100000">
+              <a:schemeClr val="phClr">
+                <a:lumMod val="99000"/>
+                <a:satMod val="120000"/>
+                <a:shade val="78000"/>
+              </a:schemeClr>
+            </a:gs>
+          </a:gsLst>
+          <a:lin ang="5400000" scaled="0"/>
+        </a:gradFill>
+      </a:fillStyleLst>
+      <a:lnStyleLst>
+        <a:ln w="6350" cap="flat" cmpd="sng" algn="ctr">
+          <a:solidFill>
+            <a:schemeClr val="phClr"/>
+          </a:solidFill>
+          <a:prstDash val="solid"/>
+          <a:miter lim="800000"/>
+        </a:ln>
+        <a:ln w="12700" cap="flat" cmpd="sng" algn="ctr">
+          <a:solidFill>
+            <a:schemeClr val="phClr"/>
+          </a:solidFill>
+          <a:prstDash val="solid"/>
+          <a:miter lim="800000"/>
+        </a:ln>
+        <a:ln w="19050" cap="flat" cmpd="sng" algn="ctr">
+          <a:solidFill>
+            <a:schemeClr val="phClr"/>
+          </a:solidFill>
+          <a:prstDash val="solid"/>
+          <a:miter lim="800000"/>
+        </a:ln>
+      </a:lnStyleLst>
+      <a:effectStyleLst>
+        <a:effectStyle>
+          <a:effectLst/>
+        </a:effectStyle>
+        <a:effectStyle>
+          <a:effectLst/>
+        </a:effectStyle>
+        <a:effectStyle>
+          <a:effectLst>
+            <a:outerShdw blurRad="57150" dist="19050" dir="5400000" algn="ctr" rotWithShape="0">
+              <a:srgbClr val="000000">
+                <a:alpha val="63000"/>
+              </a:srgbClr>
+            </a:outerShdw>
+          </a:effectLst>
+        </a:effectStyle>
+      </a:effectStyleLst>
+      <a:bgFillStyleLst>
+        <a:solidFill>
+          <a:schemeClr val="phClr"/>
+        </a:solidFill>
+        <a:solidFill>
+          <a:schemeClr val="phClr">
+            <a:tint val="95000"/>
+            <a:satMod val="170000"/>
+          </a:schemeClr>
+        </a:solidFill>
+        <a:gradFill rotWithShape="1">
+          <a:gsLst>
+            <a:gs pos="0">
+              <a:schemeClr val="phClr">
+                <a:tint val="93000"/>
+                <a:satMod val="150000"/>
+                <a:shade val="98000"/>
+                <a:lumMod val="102000"/>
+              </a:schemeClr>
+            </a:gs>
+            <a:gs pos="50000">
+              <a:schemeClr val="phClr">
+                <a:tint val="98000"/>
+                <a:satMod val="130000"/>
+                <a:shade val="90000"/>
+                <a:lumMod val="103000"/>
+              </a:schemeClr>
+            </a:gs>
+            <a:gs pos="100000">
+              <a:schemeClr val="phClr">
+                <a:shade val="63000"/>
+                <a:satMod val="120000"/>
+              </a:schemeClr>
+            </a:gs>
+          </a:gsLst>
+          <a:lin ang="5400000" scaled="0"/>
+        </a:gradFill>
+      </a:bgFillStyleLst>
+    </a:fmtScheme>
+  </a:themeElements>
+  <a:objectDefaults/>
+  <a:extraClrSchemeLst/>
+  <a:extLst>
+    <a:ext uri="{05A4C25C-085E-4340-85A3-A5531E510DB2}">
+      <thm15:themeFamily xmlns:thm15="http://schemas.microsoft.com/office/thememl/2012/main" name="Office Theme" id="{62F939B6-93AF-4DB8-9C6B-D6C7DFDC589F}" vid="{4A3C46E8-61CC-4603-A589-7422A47A8E4A}"/>
+    </a:ext>
+  </a:extLst>
+</a:theme>
 </file>
</xml_diff>